<commit_message>
Angepasste Graphik für Catastrophic Forgetting
</commit_message>
<xml_diff>
--- a/Dokumentation/Graphiken.pptx
+++ b/Dokumentation/Graphiken.pptx
@@ -211,7 +211,7 @@
           <a:p>
             <a:fld id="{B9EC3B4B-6FA9-4E93-8DE6-925625796A50}" type="datetimeFigureOut">
               <a:rPr lang="en-GB" smtClean="0"/>
-              <a:t>09/05/2019</a:t>
+              <a:t>16/05/2019</a:t>
             </a:fld>
             <a:endParaRPr lang="en-GB" dirty="0"/>
           </a:p>
@@ -370,7 +370,7 @@
           <a:p>
             <a:fld id="{2E1376D8-A72A-47F5-B9E1-9F12C055F6F3}" type="slidenum">
               <a:rPr lang="en-GB" smtClean="0"/>
-              <a:t>‹Nr.›</a:t>
+              <a:t>‹#›</a:t>
             </a:fld>
             <a:endParaRPr lang="en-GB" dirty="0"/>
           </a:p>
@@ -626,7 +626,7 @@
           <a:p>
             <a:fld id="{26B5E0E0-4D0D-4CD4-AF77-BF99AC711AE8}" type="datetimeFigureOut">
               <a:rPr lang="de-DE" smtClean="0"/>
-              <a:t>09.05.2019</a:t>
+              <a:t>16.05.2019</a:t>
             </a:fld>
             <a:endParaRPr lang="de-DE" dirty="0"/>
           </a:p>
@@ -680,7 +680,7 @@
           <a:p>
             <a:fld id="{D60157FE-D0B5-4B53-9AE5-CBDF8F90BAA9}" type="slidenum">
               <a:rPr lang="de-DE" smtClean="0"/>
-              <a:t>‹Nr.›</a:t>
+              <a:t>‹#›</a:t>
             </a:fld>
             <a:endParaRPr lang="de-DE" dirty="0"/>
           </a:p>
@@ -824,7 +824,7 @@
           <a:p>
             <a:fld id="{26B5E0E0-4D0D-4CD4-AF77-BF99AC711AE8}" type="datetimeFigureOut">
               <a:rPr lang="de-DE" smtClean="0"/>
-              <a:t>09.05.2019</a:t>
+              <a:t>16.05.2019</a:t>
             </a:fld>
             <a:endParaRPr lang="de-DE" dirty="0"/>
           </a:p>
@@ -878,7 +878,7 @@
           <a:p>
             <a:fld id="{D60157FE-D0B5-4B53-9AE5-CBDF8F90BAA9}" type="slidenum">
               <a:rPr lang="de-DE" smtClean="0"/>
-              <a:t>‹Nr.›</a:t>
+              <a:t>‹#›</a:t>
             </a:fld>
             <a:endParaRPr lang="de-DE" dirty="0"/>
           </a:p>
@@ -1032,7 +1032,7 @@
           <a:p>
             <a:fld id="{26B5E0E0-4D0D-4CD4-AF77-BF99AC711AE8}" type="datetimeFigureOut">
               <a:rPr lang="de-DE" smtClean="0"/>
-              <a:t>09.05.2019</a:t>
+              <a:t>16.05.2019</a:t>
             </a:fld>
             <a:endParaRPr lang="de-DE" dirty="0"/>
           </a:p>
@@ -1086,7 +1086,7 @@
           <a:p>
             <a:fld id="{D60157FE-D0B5-4B53-9AE5-CBDF8F90BAA9}" type="slidenum">
               <a:rPr lang="de-DE" smtClean="0"/>
-              <a:t>‹Nr.›</a:t>
+              <a:t>‹#›</a:t>
             </a:fld>
             <a:endParaRPr lang="de-DE" dirty="0"/>
           </a:p>
@@ -1230,7 +1230,7 @@
           <a:p>
             <a:fld id="{26B5E0E0-4D0D-4CD4-AF77-BF99AC711AE8}" type="datetimeFigureOut">
               <a:rPr lang="de-DE" smtClean="0"/>
-              <a:t>09.05.2019</a:t>
+              <a:t>16.05.2019</a:t>
             </a:fld>
             <a:endParaRPr lang="de-DE" dirty="0"/>
           </a:p>
@@ -1284,7 +1284,7 @@
           <a:p>
             <a:fld id="{D60157FE-D0B5-4B53-9AE5-CBDF8F90BAA9}" type="slidenum">
               <a:rPr lang="de-DE" smtClean="0"/>
-              <a:t>‹Nr.›</a:t>
+              <a:t>‹#›</a:t>
             </a:fld>
             <a:endParaRPr lang="de-DE" dirty="0"/>
           </a:p>
@@ -1505,7 +1505,7 @@
           <a:p>
             <a:fld id="{26B5E0E0-4D0D-4CD4-AF77-BF99AC711AE8}" type="datetimeFigureOut">
               <a:rPr lang="de-DE" smtClean="0"/>
-              <a:t>09.05.2019</a:t>
+              <a:t>16.05.2019</a:t>
             </a:fld>
             <a:endParaRPr lang="de-DE" dirty="0"/>
           </a:p>
@@ -1559,7 +1559,7 @@
           <a:p>
             <a:fld id="{D60157FE-D0B5-4B53-9AE5-CBDF8F90BAA9}" type="slidenum">
               <a:rPr lang="de-DE" smtClean="0"/>
-              <a:t>‹Nr.›</a:t>
+              <a:t>‹#›</a:t>
             </a:fld>
             <a:endParaRPr lang="de-DE" dirty="0"/>
           </a:p>
@@ -1770,7 +1770,7 @@
           <a:p>
             <a:fld id="{26B5E0E0-4D0D-4CD4-AF77-BF99AC711AE8}" type="datetimeFigureOut">
               <a:rPr lang="de-DE" smtClean="0"/>
-              <a:t>09.05.2019</a:t>
+              <a:t>16.05.2019</a:t>
             </a:fld>
             <a:endParaRPr lang="de-DE" dirty="0"/>
           </a:p>
@@ -1824,7 +1824,7 @@
           <a:p>
             <a:fld id="{D60157FE-D0B5-4B53-9AE5-CBDF8F90BAA9}" type="slidenum">
               <a:rPr lang="de-DE" smtClean="0"/>
-              <a:t>‹Nr.›</a:t>
+              <a:t>‹#›</a:t>
             </a:fld>
             <a:endParaRPr lang="de-DE" dirty="0"/>
           </a:p>
@@ -2182,7 +2182,7 @@
           <a:p>
             <a:fld id="{26B5E0E0-4D0D-4CD4-AF77-BF99AC711AE8}" type="datetimeFigureOut">
               <a:rPr lang="de-DE" smtClean="0"/>
-              <a:t>09.05.2019</a:t>
+              <a:t>16.05.2019</a:t>
             </a:fld>
             <a:endParaRPr lang="de-DE" dirty="0"/>
           </a:p>
@@ -2236,7 +2236,7 @@
           <a:p>
             <a:fld id="{D60157FE-D0B5-4B53-9AE5-CBDF8F90BAA9}" type="slidenum">
               <a:rPr lang="de-DE" smtClean="0"/>
-              <a:t>‹Nr.›</a:t>
+              <a:t>‹#›</a:t>
             </a:fld>
             <a:endParaRPr lang="de-DE" dirty="0"/>
           </a:p>
@@ -2323,7 +2323,7 @@
           <a:p>
             <a:fld id="{26B5E0E0-4D0D-4CD4-AF77-BF99AC711AE8}" type="datetimeFigureOut">
               <a:rPr lang="de-DE" smtClean="0"/>
-              <a:t>09.05.2019</a:t>
+              <a:t>16.05.2019</a:t>
             </a:fld>
             <a:endParaRPr lang="de-DE" dirty="0"/>
           </a:p>
@@ -2377,7 +2377,7 @@
           <a:p>
             <a:fld id="{D60157FE-D0B5-4B53-9AE5-CBDF8F90BAA9}" type="slidenum">
               <a:rPr lang="de-DE" smtClean="0"/>
-              <a:t>‹Nr.›</a:t>
+              <a:t>‹#›</a:t>
             </a:fld>
             <a:endParaRPr lang="de-DE" dirty="0"/>
           </a:p>
@@ -2436,7 +2436,7 @@
           <a:p>
             <a:fld id="{26B5E0E0-4D0D-4CD4-AF77-BF99AC711AE8}" type="datetimeFigureOut">
               <a:rPr lang="de-DE" smtClean="0"/>
-              <a:t>09.05.2019</a:t>
+              <a:t>16.05.2019</a:t>
             </a:fld>
             <a:endParaRPr lang="de-DE" dirty="0"/>
           </a:p>
@@ -2490,7 +2490,7 @@
           <a:p>
             <a:fld id="{D60157FE-D0B5-4B53-9AE5-CBDF8F90BAA9}" type="slidenum">
               <a:rPr lang="de-DE" smtClean="0"/>
-              <a:t>‹Nr.›</a:t>
+              <a:t>‹#›</a:t>
             </a:fld>
             <a:endParaRPr lang="de-DE" dirty="0"/>
           </a:p>
@@ -2747,7 +2747,7 @@
           <a:p>
             <a:fld id="{26B5E0E0-4D0D-4CD4-AF77-BF99AC711AE8}" type="datetimeFigureOut">
               <a:rPr lang="de-DE" smtClean="0"/>
-              <a:t>09.05.2019</a:t>
+              <a:t>16.05.2019</a:t>
             </a:fld>
             <a:endParaRPr lang="de-DE" dirty="0"/>
           </a:p>
@@ -2801,7 +2801,7 @@
           <a:p>
             <a:fld id="{D60157FE-D0B5-4B53-9AE5-CBDF8F90BAA9}" type="slidenum">
               <a:rPr lang="de-DE" smtClean="0"/>
-              <a:t>‹Nr.›</a:t>
+              <a:t>‹#›</a:t>
             </a:fld>
             <a:endParaRPr lang="de-DE" dirty="0"/>
           </a:p>
@@ -3035,7 +3035,7 @@
           <a:p>
             <a:fld id="{26B5E0E0-4D0D-4CD4-AF77-BF99AC711AE8}" type="datetimeFigureOut">
               <a:rPr lang="de-DE" smtClean="0"/>
-              <a:t>09.05.2019</a:t>
+              <a:t>16.05.2019</a:t>
             </a:fld>
             <a:endParaRPr lang="de-DE" dirty="0"/>
           </a:p>
@@ -3089,7 +3089,7 @@
           <a:p>
             <a:fld id="{D60157FE-D0B5-4B53-9AE5-CBDF8F90BAA9}" type="slidenum">
               <a:rPr lang="de-DE" smtClean="0"/>
-              <a:t>‹Nr.›</a:t>
+              <a:t>‹#›</a:t>
             </a:fld>
             <a:endParaRPr lang="de-DE" dirty="0"/>
           </a:p>
@@ -3276,7 +3276,7 @@
           <a:p>
             <a:fld id="{26B5E0E0-4D0D-4CD4-AF77-BF99AC711AE8}" type="datetimeFigureOut">
               <a:rPr lang="de-DE" smtClean="0"/>
-              <a:t>09.05.2019</a:t>
+              <a:t>16.05.2019</a:t>
             </a:fld>
             <a:endParaRPr lang="de-DE" dirty="0"/>
           </a:p>
@@ -3366,7 +3366,7 @@
           <a:p>
             <a:fld id="{D60157FE-D0B5-4B53-9AE5-CBDF8F90BAA9}" type="slidenum">
               <a:rPr lang="de-DE" smtClean="0"/>
-              <a:t>‹Nr.›</a:t>
+              <a:t>‹#›</a:t>
             </a:fld>
             <a:endParaRPr lang="de-DE" dirty="0"/>
           </a:p>
@@ -6417,8 +6417,8 @@
           </a:fontRef>
         </p:style>
       </p:cxnSp>
-      <mc:AlternateContent xmlns:mc="http://schemas.openxmlformats.org/markup-compatibility/2006">
-        <mc:Choice xmlns:a14="http://schemas.microsoft.com/office/drawing/2010/main" Requires="a14">
+      <mc:AlternateContent xmlns:mc="http://schemas.openxmlformats.org/markup-compatibility/2006" xmlns:a14="http://schemas.microsoft.com/office/drawing/2010/main">
+        <mc:Choice Requires="a14">
           <p:sp>
             <p:nvSpPr>
               <p:cNvPr id="26" name="Textfeld 25">
@@ -6447,6 +6447,7 @@
               </a:bodyPr>
               <a:lstStyle/>
               <a:p>
+                <a:pPr/>
                 <a14:m>
                   <m:oMathPara xmlns:m="http://schemas.openxmlformats.org/officeDocument/2006/math">
                     <m:oMathParaPr>
@@ -6502,7 +6503,7 @@
             </p:txBody>
           </p:sp>
         </mc:Choice>
-        <mc:Fallback>
+        <mc:Fallback xmlns="">
           <p:sp>
             <p:nvSpPr>
               <p:cNvPr id="26" name="Textfeld 25">
@@ -6547,8 +6548,8 @@
           </p:sp>
         </mc:Fallback>
       </mc:AlternateContent>
-      <mc:AlternateContent xmlns:mc="http://schemas.openxmlformats.org/markup-compatibility/2006">
-        <mc:Choice xmlns:a14="http://schemas.microsoft.com/office/drawing/2010/main" Requires="a14">
+      <mc:AlternateContent xmlns:mc="http://schemas.openxmlformats.org/markup-compatibility/2006" xmlns:a14="http://schemas.microsoft.com/office/drawing/2010/main">
+        <mc:Choice Requires="a14">
           <p:sp>
             <p:nvSpPr>
               <p:cNvPr id="28" name="Textfeld 27">
@@ -6602,7 +6603,7 @@
             </p:txBody>
           </p:sp>
         </mc:Choice>
-        <mc:Fallback>
+        <mc:Fallback xmlns="">
           <p:sp>
             <p:nvSpPr>
               <p:cNvPr id="28" name="Textfeld 27">
@@ -7524,8 +7525,8 @@
           <a:chExt cx="0" cy="0"/>
         </a:xfrm>
       </p:grpSpPr>
-      <mc:AlternateContent xmlns:mc="http://schemas.openxmlformats.org/markup-compatibility/2006">
-        <mc:Choice xmlns:a14="http://schemas.microsoft.com/office/drawing/2010/main" Requires="a14">
+      <mc:AlternateContent xmlns:mc="http://schemas.openxmlformats.org/markup-compatibility/2006" xmlns:a14="http://schemas.microsoft.com/office/drawing/2010/main">
+        <mc:Choice Requires="a14">
           <p:sp>
             <p:nvSpPr>
               <p:cNvPr id="4" name="Ellipse 3">
@@ -7618,7 +7619,7 @@
             </p:txBody>
           </p:sp>
         </mc:Choice>
-        <mc:Fallback>
+        <mc:Fallback xmlns="">
           <p:sp>
             <p:nvSpPr>
               <p:cNvPr id="4" name="Ellipse 3">
@@ -7686,7 +7687,9 @@
                 <a:avLst/>
               </a:prstGeom>
               <a:solidFill>
-                <a:srgbClr val="7030A0"/>
+                <a:srgbClr val="7030A0">
+                  <a:alpha val="75000"/>
+                </a:srgbClr>
               </a:solidFill>
             </p:spPr>
             <p:style>
@@ -7795,7 +7798,7 @@
               <a:lstStyle/>
               <a:p>
                 <a:r>
-                  <a:rPr lang="en-GB">
+                  <a:rPr lang="de-DE">
                     <a:noFill/>
                   </a:rPr>
                   <a:t> </a:t>

</xml_diff>

<commit_message>
Angepasst Grpahik für Catastrophic Forgetting
</commit_message>
<xml_diff>
--- a/Dokumentation/Graphiken.pptx
+++ b/Dokumentation/Graphiken.pptx
@@ -7664,8 +7664,8 @@
           </p:sp>
         </mc:Fallback>
       </mc:AlternateContent>
-      <mc:AlternateContent xmlns:mc="http://schemas.openxmlformats.org/markup-compatibility/2006">
-        <mc:Choice xmlns:a14="http://schemas.microsoft.com/office/drawing/2010/main" Requires="a14">
+      <mc:AlternateContent xmlns:mc="http://schemas.openxmlformats.org/markup-compatibility/2006" xmlns:a14="http://schemas.microsoft.com/office/drawing/2010/main">
+        <mc:Choice Requires="a14">
           <p:sp>
             <p:nvSpPr>
               <p:cNvPr id="5" name="Ellipse 4">
@@ -7763,7 +7763,7 @@
             </p:txBody>
           </p:sp>
         </mc:Choice>
-        <mc:Fallback>
+        <mc:Fallback xmlns="">
           <p:sp>
             <p:nvSpPr>
               <p:cNvPr id="5" name="Ellipse 4">

</xml_diff>

<commit_message>
Neue Graphik L DNN Algo
</commit_message>
<xml_diff>
--- a/Dokumentation/Graphiken.pptx
+++ b/Dokumentation/Graphiken.pptx
@@ -5,7 +5,7 @@
     <p:sldMasterId id="2147483648" r:id="rId1"/>
   </p:sldMasterIdLst>
   <p:notesMasterIdLst>
-    <p:notesMasterId r:id="rId9"/>
+    <p:notesMasterId r:id="rId10"/>
   </p:notesMasterIdLst>
   <p:sldIdLst>
     <p:sldId id="257" r:id="rId2"/>
@@ -15,6 +15,7 @@
     <p:sldId id="261" r:id="rId6"/>
     <p:sldId id="262" r:id="rId7"/>
     <p:sldId id="263" r:id="rId8"/>
+    <p:sldId id="264" r:id="rId9"/>
   </p:sldIdLst>
   <p:sldSz cx="12192000" cy="6858000"/>
   <p:notesSz cx="6858000" cy="9144000"/>
@@ -214,7 +215,7 @@
           <a:p>
             <a:fld id="{B9EC3B4B-6FA9-4E93-8DE6-925625796A50}" type="datetimeFigureOut">
               <a:rPr lang="en-GB" smtClean="0"/>
-              <a:t>04/06/2019</a:t>
+              <a:t>13/06/2019</a:t>
             </a:fld>
             <a:endParaRPr lang="en-GB" dirty="0"/>
           </a:p>
@@ -629,7 +630,7 @@
           <a:p>
             <a:fld id="{26B5E0E0-4D0D-4CD4-AF77-BF99AC711AE8}" type="datetimeFigureOut">
               <a:rPr lang="de-DE" smtClean="0"/>
-              <a:t>04.06.2019</a:t>
+              <a:t>13.06.2019</a:t>
             </a:fld>
             <a:endParaRPr lang="de-DE" dirty="0"/>
           </a:p>
@@ -827,7 +828,7 @@
           <a:p>
             <a:fld id="{26B5E0E0-4D0D-4CD4-AF77-BF99AC711AE8}" type="datetimeFigureOut">
               <a:rPr lang="de-DE" smtClean="0"/>
-              <a:t>04.06.2019</a:t>
+              <a:t>13.06.2019</a:t>
             </a:fld>
             <a:endParaRPr lang="de-DE" dirty="0"/>
           </a:p>
@@ -1035,7 +1036,7 @@
           <a:p>
             <a:fld id="{26B5E0E0-4D0D-4CD4-AF77-BF99AC711AE8}" type="datetimeFigureOut">
               <a:rPr lang="de-DE" smtClean="0"/>
-              <a:t>04.06.2019</a:t>
+              <a:t>13.06.2019</a:t>
             </a:fld>
             <a:endParaRPr lang="de-DE" dirty="0"/>
           </a:p>
@@ -1233,7 +1234,7 @@
           <a:p>
             <a:fld id="{26B5E0E0-4D0D-4CD4-AF77-BF99AC711AE8}" type="datetimeFigureOut">
               <a:rPr lang="de-DE" smtClean="0"/>
-              <a:t>04.06.2019</a:t>
+              <a:t>13.06.2019</a:t>
             </a:fld>
             <a:endParaRPr lang="de-DE" dirty="0"/>
           </a:p>
@@ -1508,7 +1509,7 @@
           <a:p>
             <a:fld id="{26B5E0E0-4D0D-4CD4-AF77-BF99AC711AE8}" type="datetimeFigureOut">
               <a:rPr lang="de-DE" smtClean="0"/>
-              <a:t>04.06.2019</a:t>
+              <a:t>13.06.2019</a:t>
             </a:fld>
             <a:endParaRPr lang="de-DE" dirty="0"/>
           </a:p>
@@ -1773,7 +1774,7 @@
           <a:p>
             <a:fld id="{26B5E0E0-4D0D-4CD4-AF77-BF99AC711AE8}" type="datetimeFigureOut">
               <a:rPr lang="de-DE" smtClean="0"/>
-              <a:t>04.06.2019</a:t>
+              <a:t>13.06.2019</a:t>
             </a:fld>
             <a:endParaRPr lang="de-DE" dirty="0"/>
           </a:p>
@@ -2185,7 +2186,7 @@
           <a:p>
             <a:fld id="{26B5E0E0-4D0D-4CD4-AF77-BF99AC711AE8}" type="datetimeFigureOut">
               <a:rPr lang="de-DE" smtClean="0"/>
-              <a:t>04.06.2019</a:t>
+              <a:t>13.06.2019</a:t>
             </a:fld>
             <a:endParaRPr lang="de-DE" dirty="0"/>
           </a:p>
@@ -2326,7 +2327,7 @@
           <a:p>
             <a:fld id="{26B5E0E0-4D0D-4CD4-AF77-BF99AC711AE8}" type="datetimeFigureOut">
               <a:rPr lang="de-DE" smtClean="0"/>
-              <a:t>04.06.2019</a:t>
+              <a:t>13.06.2019</a:t>
             </a:fld>
             <a:endParaRPr lang="de-DE" dirty="0"/>
           </a:p>
@@ -2439,7 +2440,7 @@
           <a:p>
             <a:fld id="{26B5E0E0-4D0D-4CD4-AF77-BF99AC711AE8}" type="datetimeFigureOut">
               <a:rPr lang="de-DE" smtClean="0"/>
-              <a:t>04.06.2019</a:t>
+              <a:t>13.06.2019</a:t>
             </a:fld>
             <a:endParaRPr lang="de-DE" dirty="0"/>
           </a:p>
@@ -2750,7 +2751,7 @@
           <a:p>
             <a:fld id="{26B5E0E0-4D0D-4CD4-AF77-BF99AC711AE8}" type="datetimeFigureOut">
               <a:rPr lang="de-DE" smtClean="0"/>
-              <a:t>04.06.2019</a:t>
+              <a:t>13.06.2019</a:t>
             </a:fld>
             <a:endParaRPr lang="de-DE" dirty="0"/>
           </a:p>
@@ -3038,7 +3039,7 @@
           <a:p>
             <a:fld id="{26B5E0E0-4D0D-4CD4-AF77-BF99AC711AE8}" type="datetimeFigureOut">
               <a:rPr lang="de-DE" smtClean="0"/>
-              <a:t>04.06.2019</a:t>
+              <a:t>13.06.2019</a:t>
             </a:fld>
             <a:endParaRPr lang="de-DE" dirty="0"/>
           </a:p>
@@ -3279,7 +3280,7 @@
           <a:p>
             <a:fld id="{26B5E0E0-4D0D-4CD4-AF77-BF99AC711AE8}" type="datetimeFigureOut">
               <a:rPr lang="de-DE" smtClean="0"/>
-              <a:t>04.06.2019</a:t>
+              <a:t>13.06.2019</a:t>
             </a:fld>
             <a:endParaRPr lang="de-DE" dirty="0"/>
           </a:p>
@@ -11967,7 +11968,7 @@
         </p:nvSpPr>
         <p:spPr>
           <a:xfrm>
-            <a:off x="2969704" y="1157680"/>
+            <a:off x="830512" y="1115735"/>
             <a:ext cx="1728132" cy="528507"/>
           </a:xfrm>
           <a:prstGeom prst="rect">
@@ -12022,7 +12023,7 @@
         </p:nvCxnSpPr>
         <p:spPr>
           <a:xfrm>
-            <a:off x="3833770" y="713064"/>
+            <a:off x="1694578" y="671119"/>
             <a:ext cx="0" cy="444616"/>
           </a:xfrm>
           <a:prstGeom prst="straightConnector1">
@@ -12061,7 +12062,7 @@
         </p:nvSpPr>
         <p:spPr>
           <a:xfrm>
-            <a:off x="2969704" y="2130803"/>
+            <a:off x="830512" y="2088858"/>
             <a:ext cx="1728132" cy="528507"/>
           </a:xfrm>
           <a:prstGeom prst="rect">
@@ -12117,7 +12118,7 @@
         </p:nvCxnSpPr>
         <p:spPr>
           <a:xfrm>
-            <a:off x="3833770" y="1686187"/>
+            <a:off x="1694578" y="1644242"/>
             <a:ext cx="0" cy="444616"/>
           </a:xfrm>
           <a:prstGeom prst="straightConnector1">
@@ -12156,7 +12157,7 @@
         </p:nvSpPr>
         <p:spPr>
           <a:xfrm>
-            <a:off x="3716770" y="3103926"/>
+            <a:off x="1577578" y="3061981"/>
             <a:ext cx="234000" cy="234000"/>
           </a:xfrm>
           <a:prstGeom prst="ellipse">
@@ -12212,7 +12213,7 @@
         </p:nvCxnSpPr>
         <p:spPr>
           <a:xfrm>
-            <a:off x="3833770" y="2659310"/>
+            <a:off x="1694578" y="2617365"/>
             <a:ext cx="0" cy="444616"/>
           </a:xfrm>
           <a:prstGeom prst="straightConnector1">
@@ -12251,7 +12252,7 @@
         </p:nvSpPr>
         <p:spPr>
           <a:xfrm>
-            <a:off x="3833770" y="1759829"/>
+            <a:off x="1694578" y="1717884"/>
             <a:ext cx="747063" cy="276999"/>
           </a:xfrm>
           <a:prstGeom prst="rect">
@@ -12291,7 +12292,7 @@
         </p:nvCxnSpPr>
         <p:spPr>
           <a:xfrm rot="16200000" flipH="1">
-            <a:off x="2685505" y="1955661"/>
+            <a:off x="546313" y="1913716"/>
             <a:ext cx="2413530" cy="117000"/>
           </a:xfrm>
           <a:prstGeom prst="bentConnector4">
@@ -12319,8 +12320,8 @@
           </a:fontRef>
         </p:style>
       </p:cxnSp>
-      <mc:AlternateContent xmlns:mc="http://schemas.openxmlformats.org/markup-compatibility/2006">
-        <mc:Choice xmlns:a14="http://schemas.microsoft.com/office/drawing/2010/main" Requires="a14">
+      <mc:AlternateContent xmlns:mc="http://schemas.openxmlformats.org/markup-compatibility/2006" xmlns:a14="http://schemas.microsoft.com/office/drawing/2010/main">
+        <mc:Choice Requires="a14">
           <p:sp>
             <p:nvSpPr>
               <p:cNvPr id="53" name="Textfeld 52">
@@ -12335,7 +12336,7 @@
             </p:nvSpPr>
             <p:spPr>
               <a:xfrm>
-                <a:off x="5071368" y="1769995"/>
+                <a:off x="2932176" y="1728050"/>
                 <a:ext cx="677680" cy="461665"/>
               </a:xfrm>
               <a:prstGeom prst="rect">
@@ -12383,7 +12384,7 @@
             </p:txBody>
           </p:sp>
         </mc:Choice>
-        <mc:Fallback>
+        <mc:Fallback xmlns="">
           <p:sp>
             <p:nvSpPr>
               <p:cNvPr id="53" name="Textfeld 52">
@@ -12400,7 +12401,7 @@
             </p:nvSpPr>
             <p:spPr>
               <a:xfrm>
-                <a:off x="5071368" y="1769995"/>
+                <a:off x="2932176" y="1728050"/>
                 <a:ext cx="677680" cy="461665"/>
               </a:xfrm>
               <a:prstGeom prst="rect">
@@ -12409,7 +12410,7 @@
               <a:blipFill>
                 <a:blip r:embed="rId2"/>
                 <a:stretch>
-                  <a:fillRect l="-901" b="-7895"/>
+                  <a:fillRect b="-7895"/>
                 </a:stretch>
               </a:blipFill>
             </p:spPr>
@@ -12428,8 +12429,8 @@
           </p:sp>
         </mc:Fallback>
       </mc:AlternateContent>
-      <mc:AlternateContent xmlns:mc="http://schemas.openxmlformats.org/markup-compatibility/2006">
-        <mc:Choice xmlns:a14="http://schemas.microsoft.com/office/drawing/2010/main" Requires="a14">
+      <mc:AlternateContent xmlns:mc="http://schemas.openxmlformats.org/markup-compatibility/2006" xmlns:a14="http://schemas.microsoft.com/office/drawing/2010/main">
+        <mc:Choice Requires="a14">
           <p:sp>
             <p:nvSpPr>
               <p:cNvPr id="54" name="Textfeld 53">
@@ -12444,7 +12445,7 @@
             </p:nvSpPr>
             <p:spPr>
               <a:xfrm>
-                <a:off x="3494930" y="436065"/>
+                <a:off x="1355738" y="394120"/>
                 <a:ext cx="677680" cy="276999"/>
               </a:xfrm>
               <a:prstGeom prst="rect">
@@ -12483,7 +12484,7 @@
             </p:txBody>
           </p:sp>
         </mc:Choice>
-        <mc:Fallback>
+        <mc:Fallback xmlns="">
           <p:sp>
             <p:nvSpPr>
               <p:cNvPr id="54" name="Textfeld 53">
@@ -12500,7 +12501,7 @@
             </p:nvSpPr>
             <p:spPr>
               <a:xfrm>
-                <a:off x="3494930" y="436065"/>
+                <a:off x="1355738" y="394120"/>
                 <a:ext cx="677680" cy="276999"/>
               </a:xfrm>
               <a:prstGeom prst="rect">
@@ -12528,8 +12529,8 @@
           </p:sp>
         </mc:Fallback>
       </mc:AlternateContent>
-      <mc:AlternateContent xmlns:mc="http://schemas.openxmlformats.org/markup-compatibility/2006">
-        <mc:Choice xmlns:a14="http://schemas.microsoft.com/office/drawing/2010/main" Requires="a14">
+      <mc:AlternateContent xmlns:mc="http://schemas.openxmlformats.org/markup-compatibility/2006" xmlns:a14="http://schemas.microsoft.com/office/drawing/2010/main">
+        <mc:Choice Requires="a14">
           <p:sp>
             <p:nvSpPr>
               <p:cNvPr id="55" name="Textfeld 54">
@@ -12544,7 +12545,7 @@
             </p:nvSpPr>
             <p:spPr>
               <a:xfrm>
-                <a:off x="2409024" y="1759828"/>
+                <a:off x="269832" y="1717883"/>
                 <a:ext cx="677680" cy="276999"/>
               </a:xfrm>
               <a:prstGeom prst="rect">
@@ -12605,7 +12606,7 @@
             </p:txBody>
           </p:sp>
         </mc:Choice>
-        <mc:Fallback>
+        <mc:Fallback xmlns="">
           <p:sp>
             <p:nvSpPr>
               <p:cNvPr id="55" name="Textfeld 54">
@@ -12622,7 +12623,7 @@
             </p:nvSpPr>
             <p:spPr>
               <a:xfrm>
-                <a:off x="2409024" y="1759828"/>
+                <a:off x="269832" y="1717883"/>
                 <a:ext cx="677680" cy="276999"/>
               </a:xfrm>
               <a:prstGeom prst="rect">
@@ -12650,8 +12651,8 @@
           </p:sp>
         </mc:Fallback>
       </mc:AlternateContent>
-      <mc:AlternateContent xmlns:mc="http://schemas.openxmlformats.org/markup-compatibility/2006">
-        <mc:Choice xmlns:a14="http://schemas.microsoft.com/office/drawing/2010/main" Requires="a14">
+      <mc:AlternateContent xmlns:mc="http://schemas.openxmlformats.org/markup-compatibility/2006" xmlns:a14="http://schemas.microsoft.com/office/drawing/2010/main">
+        <mc:Choice Requires="a14">
           <p:sp>
             <p:nvSpPr>
               <p:cNvPr id="57" name="Textfeld 56">
@@ -12666,7 +12667,7 @@
             </p:nvSpPr>
             <p:spPr>
               <a:xfrm>
-                <a:off x="2937176" y="3082426"/>
+                <a:off x="797984" y="3040481"/>
                 <a:ext cx="829375" cy="276999"/>
               </a:xfrm>
               <a:prstGeom prst="rect">
@@ -12740,7 +12741,7 @@
             </p:txBody>
           </p:sp>
         </mc:Choice>
-        <mc:Fallback>
+        <mc:Fallback xmlns="">
           <p:sp>
             <p:nvSpPr>
               <p:cNvPr id="57" name="Textfeld 56">
@@ -12757,7 +12758,7 @@
             </p:nvSpPr>
             <p:spPr>
               <a:xfrm>
-                <a:off x="2937176" y="3082426"/>
+                <a:off x="797984" y="3040481"/>
                 <a:ext cx="829375" cy="276999"/>
               </a:xfrm>
               <a:prstGeom prst="rect">
@@ -12802,7 +12803,7 @@
         </p:nvCxnSpPr>
         <p:spPr>
           <a:xfrm>
-            <a:off x="3833770" y="3337926"/>
+            <a:off x="1694578" y="3295981"/>
             <a:ext cx="0" cy="327616"/>
           </a:xfrm>
           <a:prstGeom prst="straightConnector1">
@@ -12841,7 +12842,7 @@
         </p:nvSpPr>
         <p:spPr>
           <a:xfrm>
-            <a:off x="3833769" y="3548542"/>
+            <a:off x="1694577" y="3506597"/>
             <a:ext cx="747063" cy="276999"/>
           </a:xfrm>
           <a:prstGeom prst="rect">
@@ -12865,10 +12866,3056 @@
           </a:p>
         </p:txBody>
       </p:sp>
+      <mc:AlternateContent xmlns:mc="http://schemas.openxmlformats.org/markup-compatibility/2006" xmlns:a14="http://schemas.microsoft.com/office/drawing/2010/main">
+        <mc:Choice Requires="a14">
+          <p:sp>
+            <p:nvSpPr>
+              <p:cNvPr id="3" name="Rechteck 2">
+                <a:extLst>
+                  <a:ext uri="{FF2B5EF4-FFF2-40B4-BE49-F238E27FC236}">
+                    <a16:creationId xmlns:a16="http://schemas.microsoft.com/office/drawing/2014/main" id="{6E76F476-D2D3-43AD-8D33-3D7669E99A83}"/>
+                  </a:ext>
+                </a:extLst>
+              </p:cNvPr>
+              <p:cNvSpPr/>
+              <p:nvPr/>
+            </p:nvSpPr>
+            <p:spPr>
+              <a:xfrm>
+                <a:off x="6979640" y="4367997"/>
+                <a:ext cx="2192139" cy="430058"/>
+              </a:xfrm>
+              <a:prstGeom prst="rect">
+                <a:avLst/>
+              </a:prstGeom>
+            </p:spPr>
+            <p:style>
+              <a:lnRef idx="2">
+                <a:schemeClr val="accent1">
+                  <a:shade val="50000"/>
+                </a:schemeClr>
+              </a:lnRef>
+              <a:fillRef idx="1">
+                <a:schemeClr val="accent1"/>
+              </a:fillRef>
+              <a:effectRef idx="0">
+                <a:schemeClr val="accent1"/>
+              </a:effectRef>
+              <a:fontRef idx="minor">
+                <a:schemeClr val="lt1"/>
+              </a:fontRef>
+            </p:style>
+            <p:txBody>
+              <a:bodyPr rtlCol="0" anchor="ctr"/>
+              <a:lstStyle/>
+              <a:p>
+                <a:pPr algn="ctr"/>
+                <a14:m>
+                  <m:oMathPara xmlns:m="http://schemas.openxmlformats.org/officeDocument/2006/math">
+                    <m:oMathParaPr>
+                      <m:jc m:val="centerGroup"/>
+                    </m:oMathParaPr>
+                    <m:oMath xmlns:m="http://schemas.openxmlformats.org/officeDocument/2006/math">
+                      <m:sSub>
+                        <m:sSubPr>
+                          <m:ctrlPr>
+                            <a:rPr lang="de-DE" b="0" i="1" smtClean="0">
+                              <a:latin typeface="Cambria Math" panose="02040503050406030204" pitchFamily="18" charset="0"/>
+                            </a:rPr>
+                          </m:ctrlPr>
+                        </m:sSubPr>
+                        <m:e>
+                          <m:r>
+                            <a:rPr lang="de-DE" b="0" i="1" smtClean="0">
+                              <a:latin typeface="Cambria Math" panose="02040503050406030204" pitchFamily="18" charset="0"/>
+                            </a:rPr>
+                            <m:t>𝐼</m:t>
+                          </m:r>
+                        </m:e>
+                        <m:sub>
+                          <m:r>
+                            <a:rPr lang="de-DE" b="0" i="1" smtClean="0">
+                              <a:latin typeface="Cambria Math" panose="02040503050406030204" pitchFamily="18" charset="0"/>
+                            </a:rPr>
+                            <m:t>1</m:t>
+                          </m:r>
+                        </m:sub>
+                      </m:sSub>
+                      <m:r>
+                        <a:rPr lang="de-DE" b="0" i="1" smtClean="0">
+                          <a:latin typeface="Cambria Math" panose="02040503050406030204" pitchFamily="18" charset="0"/>
+                        </a:rPr>
+                        <m:t>   </m:t>
+                      </m:r>
+                      <m:sSub>
+                        <m:sSubPr>
+                          <m:ctrlPr>
+                            <a:rPr lang="de-DE" b="0" i="1" smtClean="0">
+                              <a:latin typeface="Cambria Math" panose="02040503050406030204" pitchFamily="18" charset="0"/>
+                            </a:rPr>
+                          </m:ctrlPr>
+                        </m:sSubPr>
+                        <m:e>
+                          <m:r>
+                            <a:rPr lang="de-DE" b="0" i="1" smtClean="0">
+                              <a:latin typeface="Cambria Math" panose="02040503050406030204" pitchFamily="18" charset="0"/>
+                            </a:rPr>
+                            <m:t>𝐼</m:t>
+                          </m:r>
+                        </m:e>
+                        <m:sub>
+                          <m:r>
+                            <a:rPr lang="de-DE" b="0" i="1" smtClean="0">
+                              <a:latin typeface="Cambria Math" panose="02040503050406030204" pitchFamily="18" charset="0"/>
+                            </a:rPr>
+                            <m:t>2</m:t>
+                          </m:r>
+                        </m:sub>
+                      </m:sSub>
+                      <m:r>
+                        <a:rPr lang="de-DE" b="0" i="1" smtClean="0">
+                          <a:latin typeface="Cambria Math" panose="02040503050406030204" pitchFamily="18" charset="0"/>
+                        </a:rPr>
+                        <m:t>   ………   </m:t>
+                      </m:r>
+                      <m:sSub>
+                        <m:sSubPr>
+                          <m:ctrlPr>
+                            <a:rPr lang="de-DE" b="0" i="1" smtClean="0">
+                              <a:latin typeface="Cambria Math" panose="02040503050406030204" pitchFamily="18" charset="0"/>
+                            </a:rPr>
+                          </m:ctrlPr>
+                        </m:sSubPr>
+                        <m:e>
+                          <m:r>
+                            <a:rPr lang="de-DE" b="0" i="1" smtClean="0">
+                              <a:latin typeface="Cambria Math" panose="02040503050406030204" pitchFamily="18" charset="0"/>
+                            </a:rPr>
+                            <m:t>𝐼</m:t>
+                          </m:r>
+                        </m:e>
+                        <m:sub>
+                          <m:r>
+                            <a:rPr lang="de-DE" b="0" i="1" smtClean="0">
+                              <a:latin typeface="Cambria Math" panose="02040503050406030204" pitchFamily="18" charset="0"/>
+                            </a:rPr>
+                            <m:t>𝑑</m:t>
+                          </m:r>
+                        </m:sub>
+                      </m:sSub>
+                    </m:oMath>
+                  </m:oMathPara>
+                </a14:m>
+                <a:endParaRPr lang="en-GB" dirty="0"/>
+              </a:p>
+            </p:txBody>
+          </p:sp>
+        </mc:Choice>
+        <mc:Fallback xmlns="">
+          <p:sp>
+            <p:nvSpPr>
+              <p:cNvPr id="3" name="Rechteck 2">
+                <a:extLst>
+                  <a:ext uri="{FF2B5EF4-FFF2-40B4-BE49-F238E27FC236}">
+                    <a16:creationId xmlns:a16="http://schemas.microsoft.com/office/drawing/2014/main" id="{6E76F476-D2D3-43AD-8D33-3D7669E99A83}"/>
+                  </a:ext>
+                </a:extLst>
+              </p:cNvPr>
+              <p:cNvSpPr>
+                <a:spLocks noRot="1" noChangeAspect="1" noMove="1" noResize="1" noEditPoints="1" noAdjustHandles="1" noChangeArrowheads="1" noChangeShapeType="1" noTextEdit="1"/>
+              </p:cNvSpPr>
+              <p:nvPr/>
+            </p:nvSpPr>
+            <p:spPr>
+              <a:xfrm>
+                <a:off x="6979640" y="4367997"/>
+                <a:ext cx="2192139" cy="430058"/>
+              </a:xfrm>
+              <a:prstGeom prst="rect">
+                <a:avLst/>
+              </a:prstGeom>
+              <a:blipFill>
+                <a:blip r:embed="rId6"/>
+                <a:stretch>
+                  <a:fillRect/>
+                </a:stretch>
+              </a:blipFill>
+            </p:spPr>
+            <p:txBody>
+              <a:bodyPr/>
+              <a:lstStyle/>
+              <a:p>
+                <a:r>
+                  <a:rPr lang="en-GB">
+                    <a:noFill/>
+                  </a:rPr>
+                  <a:t> </a:t>
+                </a:r>
+              </a:p>
+            </p:txBody>
+          </p:sp>
+        </mc:Fallback>
+      </mc:AlternateContent>
+      <p:cxnSp>
+        <p:nvCxnSpPr>
+          <p:cNvPr id="17" name="Gerade Verbindung mit Pfeil 16">
+            <a:extLst>
+              <a:ext uri="{FF2B5EF4-FFF2-40B4-BE49-F238E27FC236}">
+                <a16:creationId xmlns:a16="http://schemas.microsoft.com/office/drawing/2014/main" id="{183E6EB6-6F88-4496-8905-75808988894E}"/>
+              </a:ext>
+            </a:extLst>
+          </p:cNvPr>
+          <p:cNvCxnSpPr>
+            <a:cxnSpLocks/>
+            <a:stCxn id="21" idx="0"/>
+            <a:endCxn id="3" idx="2"/>
+          </p:cNvCxnSpPr>
+          <p:nvPr/>
+        </p:nvCxnSpPr>
+        <p:spPr>
+          <a:xfrm flipV="1">
+            <a:off x="8075709" y="4798055"/>
+            <a:ext cx="1" cy="470231"/>
+          </a:xfrm>
+          <a:prstGeom prst="straightConnector1">
+            <a:avLst/>
+          </a:prstGeom>
+          <a:ln w="25400">
+            <a:tailEnd type="triangle"/>
+          </a:ln>
+        </p:spPr>
+        <p:style>
+          <a:lnRef idx="1">
+            <a:schemeClr val="accent1"/>
+          </a:lnRef>
+          <a:fillRef idx="0">
+            <a:schemeClr val="accent1"/>
+          </a:fillRef>
+          <a:effectRef idx="0">
+            <a:schemeClr val="accent1"/>
+          </a:effectRef>
+          <a:fontRef idx="minor">
+            <a:schemeClr val="tx1"/>
+          </a:fontRef>
+        </p:style>
+      </p:cxnSp>
+      <p:sp>
+        <p:nvSpPr>
+          <p:cNvPr id="21" name="Textfeld 20">
+            <a:extLst>
+              <a:ext uri="{FF2B5EF4-FFF2-40B4-BE49-F238E27FC236}">
+                <a16:creationId xmlns:a16="http://schemas.microsoft.com/office/drawing/2014/main" id="{94689BB6-A5CC-483B-AAF7-6E6CCB3F53A2}"/>
+              </a:ext>
+            </a:extLst>
+          </p:cNvPr>
+          <p:cNvSpPr txBox="1"/>
+          <p:nvPr/>
+        </p:nvSpPr>
+        <p:spPr>
+          <a:xfrm>
+            <a:off x="7378821" y="5268286"/>
+            <a:ext cx="1393775" cy="461665"/>
+          </a:xfrm>
+          <a:prstGeom prst="rect">
+            <a:avLst/>
+          </a:prstGeom>
+          <a:noFill/>
+        </p:spPr>
+        <p:txBody>
+          <a:bodyPr wrap="square" rtlCol="0">
+            <a:spAutoFit/>
+          </a:bodyPr>
+          <a:lstStyle/>
+          <a:p>
+            <a:r>
+              <a:rPr lang="en-GB" sz="1200" dirty="0" err="1">
+                <a:latin typeface="Arial" panose="020B0604020202020204" pitchFamily="34" charset="0"/>
+                <a:cs typeface="Arial" panose="020B0604020202020204" pitchFamily="34" charset="0"/>
+              </a:rPr>
+              <a:t>Eingangssignal</a:t>
+            </a:r>
+            <a:r>
+              <a:rPr lang="en-GB" sz="1200" dirty="0">
+                <a:latin typeface="Arial" panose="020B0604020202020204" pitchFamily="34" charset="0"/>
+                <a:cs typeface="Arial" panose="020B0604020202020204" pitchFamily="34" charset="0"/>
+              </a:rPr>
+              <a:t> der </a:t>
+            </a:r>
+            <a:r>
+              <a:rPr lang="en-GB" sz="1200" dirty="0" err="1">
+                <a:latin typeface="Arial" panose="020B0604020202020204" pitchFamily="34" charset="0"/>
+                <a:cs typeface="Arial" panose="020B0604020202020204" pitchFamily="34" charset="0"/>
+              </a:rPr>
+              <a:t>Größe</a:t>
+            </a:r>
+            <a:r>
+              <a:rPr lang="en-GB" sz="1200" dirty="0">
+                <a:latin typeface="Arial" panose="020B0604020202020204" pitchFamily="34" charset="0"/>
+                <a:cs typeface="Arial" panose="020B0604020202020204" pitchFamily="34" charset="0"/>
+              </a:rPr>
+              <a:t> </a:t>
+            </a:r>
+            <a:r>
+              <a:rPr lang="en-GB" sz="1200" b="1" i="1" dirty="0">
+                <a:latin typeface="Arial" panose="020B0604020202020204" pitchFamily="34" charset="0"/>
+                <a:cs typeface="Arial" panose="020B0604020202020204" pitchFamily="34" charset="0"/>
+              </a:rPr>
+              <a:t>d</a:t>
+            </a:r>
+          </a:p>
+        </p:txBody>
+      </p:sp>
+      <p:cxnSp>
+        <p:nvCxnSpPr>
+          <p:cNvPr id="23" name="Gerade Verbindung mit Pfeil 22">
+            <a:extLst>
+              <a:ext uri="{FF2B5EF4-FFF2-40B4-BE49-F238E27FC236}">
+                <a16:creationId xmlns:a16="http://schemas.microsoft.com/office/drawing/2014/main" id="{2FE90B64-A583-4689-85C4-F09287C5306E}"/>
+              </a:ext>
+            </a:extLst>
+          </p:cNvPr>
+          <p:cNvCxnSpPr>
+            <a:cxnSpLocks/>
+            <a:stCxn id="21" idx="0"/>
+          </p:cNvCxnSpPr>
+          <p:nvPr/>
+        </p:nvCxnSpPr>
+        <p:spPr>
+          <a:xfrm flipV="1">
+            <a:off x="8075709" y="4798055"/>
+            <a:ext cx="696887" cy="470231"/>
+          </a:xfrm>
+          <a:prstGeom prst="straightConnector1">
+            <a:avLst/>
+          </a:prstGeom>
+          <a:ln w="25400">
+            <a:tailEnd type="triangle"/>
+          </a:ln>
+        </p:spPr>
+        <p:style>
+          <a:lnRef idx="1">
+            <a:schemeClr val="accent1"/>
+          </a:lnRef>
+          <a:fillRef idx="0">
+            <a:schemeClr val="accent1"/>
+          </a:fillRef>
+          <a:effectRef idx="0">
+            <a:schemeClr val="accent1"/>
+          </a:effectRef>
+          <a:fontRef idx="minor">
+            <a:schemeClr val="tx1"/>
+          </a:fontRef>
+        </p:style>
+      </p:cxnSp>
+      <p:cxnSp>
+        <p:nvCxnSpPr>
+          <p:cNvPr id="26" name="Gerade Verbindung mit Pfeil 25">
+            <a:extLst>
+              <a:ext uri="{FF2B5EF4-FFF2-40B4-BE49-F238E27FC236}">
+                <a16:creationId xmlns:a16="http://schemas.microsoft.com/office/drawing/2014/main" id="{61C5E18C-37E2-48BC-9397-FEBD8324B776}"/>
+              </a:ext>
+            </a:extLst>
+          </p:cNvPr>
+          <p:cNvCxnSpPr>
+            <a:cxnSpLocks/>
+            <a:stCxn id="21" idx="0"/>
+          </p:cNvCxnSpPr>
+          <p:nvPr/>
+        </p:nvCxnSpPr>
+        <p:spPr>
+          <a:xfrm flipH="1" flipV="1">
+            <a:off x="7378821" y="4798055"/>
+            <a:ext cx="696888" cy="470231"/>
+          </a:xfrm>
+          <a:prstGeom prst="straightConnector1">
+            <a:avLst/>
+          </a:prstGeom>
+          <a:ln w="25400">
+            <a:tailEnd type="triangle"/>
+          </a:ln>
+        </p:spPr>
+        <p:style>
+          <a:lnRef idx="1">
+            <a:schemeClr val="accent1"/>
+          </a:lnRef>
+          <a:fillRef idx="0">
+            <a:schemeClr val="accent1"/>
+          </a:fillRef>
+          <a:effectRef idx="0">
+            <a:schemeClr val="accent1"/>
+          </a:effectRef>
+          <a:fontRef idx="minor">
+            <a:schemeClr val="tx1"/>
+          </a:fontRef>
+        </p:style>
+      </p:cxnSp>
+      <p:sp>
+        <p:nvSpPr>
+          <p:cNvPr id="30" name="Textfeld 29">
+            <a:extLst>
+              <a:ext uri="{FF2B5EF4-FFF2-40B4-BE49-F238E27FC236}">
+                <a16:creationId xmlns:a16="http://schemas.microsoft.com/office/drawing/2014/main" id="{792F2309-6F9A-4B52-A6EA-0F7EA28BF34F}"/>
+              </a:ext>
+            </a:extLst>
+          </p:cNvPr>
+          <p:cNvSpPr txBox="1"/>
+          <p:nvPr/>
+        </p:nvSpPr>
+        <p:spPr>
+          <a:xfrm>
+            <a:off x="5680235" y="4444526"/>
+            <a:ext cx="1299403" cy="276999"/>
+          </a:xfrm>
+          <a:prstGeom prst="rect">
+            <a:avLst/>
+          </a:prstGeom>
+          <a:noFill/>
+        </p:spPr>
+        <p:txBody>
+          <a:bodyPr wrap="square" rtlCol="0">
+            <a:spAutoFit/>
+          </a:bodyPr>
+          <a:lstStyle/>
+          <a:p>
+            <a:r>
+              <a:rPr lang="en-GB" sz="1200" dirty="0" err="1">
+                <a:latin typeface="Arial" panose="020B0604020202020204" pitchFamily="34" charset="0"/>
+                <a:cs typeface="Arial" panose="020B0604020202020204" pitchFamily="34" charset="0"/>
+              </a:rPr>
+              <a:t>Eingangsschicht</a:t>
+            </a:r>
+            <a:endParaRPr lang="en-GB" sz="1200" dirty="0">
+              <a:latin typeface="Arial" panose="020B0604020202020204" pitchFamily="34" charset="0"/>
+              <a:cs typeface="Arial" panose="020B0604020202020204" pitchFamily="34" charset="0"/>
+            </a:endParaRPr>
+          </a:p>
+        </p:txBody>
+      </p:sp>
+      <mc:AlternateContent xmlns:mc="http://schemas.openxmlformats.org/markup-compatibility/2006" xmlns:a14="http://schemas.microsoft.com/office/drawing/2010/main">
+        <mc:Choice Requires="a14">
+          <p:sp>
+            <p:nvSpPr>
+              <p:cNvPr id="31" name="Rechteck 30">
+                <a:extLst>
+                  <a:ext uri="{FF2B5EF4-FFF2-40B4-BE49-F238E27FC236}">
+                    <a16:creationId xmlns:a16="http://schemas.microsoft.com/office/drawing/2014/main" id="{512D6EEE-A5B3-466E-855F-E9CFE9A00833}"/>
+                  </a:ext>
+                </a:extLst>
+              </p:cNvPr>
+              <p:cNvSpPr/>
+              <p:nvPr/>
+            </p:nvSpPr>
+            <p:spPr>
+              <a:xfrm>
+                <a:off x="6979638" y="3353537"/>
+                <a:ext cx="2192139" cy="430059"/>
+              </a:xfrm>
+              <a:prstGeom prst="rect">
+                <a:avLst/>
+              </a:prstGeom>
+            </p:spPr>
+            <p:style>
+              <a:lnRef idx="2">
+                <a:schemeClr val="accent1">
+                  <a:shade val="50000"/>
+                </a:schemeClr>
+              </a:lnRef>
+              <a:fillRef idx="1">
+                <a:schemeClr val="accent1"/>
+              </a:fillRef>
+              <a:effectRef idx="0">
+                <a:schemeClr val="accent1"/>
+              </a:effectRef>
+              <a:fontRef idx="minor">
+                <a:schemeClr val="lt1"/>
+              </a:fontRef>
+            </p:style>
+            <p:txBody>
+              <a:bodyPr rtlCol="0" anchor="ctr"/>
+              <a:lstStyle/>
+              <a:p>
+                <a:pPr algn="ctr"/>
+                <a14:m>
+                  <m:oMathPara xmlns:m="http://schemas.openxmlformats.org/officeDocument/2006/math">
+                    <m:oMathParaPr>
+                      <m:jc m:val="centerGroup"/>
+                    </m:oMathParaPr>
+                    <m:oMath xmlns:m="http://schemas.openxmlformats.org/officeDocument/2006/math">
+                      <m:sSub>
+                        <m:sSubPr>
+                          <m:ctrlPr>
+                            <a:rPr lang="de-DE" b="0" i="1" smtClean="0">
+                              <a:latin typeface="Cambria Math" panose="02040503050406030204" pitchFamily="18" charset="0"/>
+                            </a:rPr>
+                          </m:ctrlPr>
+                        </m:sSubPr>
+                        <m:e>
+                          <m:r>
+                            <a:rPr lang="de-DE" b="0" i="1" smtClean="0">
+                              <a:latin typeface="Cambria Math" panose="02040503050406030204" pitchFamily="18" charset="0"/>
+                            </a:rPr>
+                            <m:t>𝑂</m:t>
+                          </m:r>
+                        </m:e>
+                        <m:sub>
+                          <m:r>
+                            <a:rPr lang="de-DE" b="0" i="1" smtClean="0">
+                              <a:latin typeface="Cambria Math" panose="02040503050406030204" pitchFamily="18" charset="0"/>
+                            </a:rPr>
+                            <m:t>1</m:t>
+                          </m:r>
+                        </m:sub>
+                      </m:sSub>
+                      <m:r>
+                        <a:rPr lang="de-DE" b="0" i="1" smtClean="0">
+                          <a:latin typeface="Cambria Math" panose="02040503050406030204" pitchFamily="18" charset="0"/>
+                        </a:rPr>
+                        <m:t>   </m:t>
+                      </m:r>
+                      <m:sSub>
+                        <m:sSubPr>
+                          <m:ctrlPr>
+                            <a:rPr lang="de-DE" b="0" i="1" smtClean="0">
+                              <a:latin typeface="Cambria Math" panose="02040503050406030204" pitchFamily="18" charset="0"/>
+                            </a:rPr>
+                          </m:ctrlPr>
+                        </m:sSubPr>
+                        <m:e>
+                          <m:r>
+                            <a:rPr lang="de-DE" b="0" i="1" smtClean="0">
+                              <a:latin typeface="Cambria Math" panose="02040503050406030204" pitchFamily="18" charset="0"/>
+                            </a:rPr>
+                            <m:t>𝑂</m:t>
+                          </m:r>
+                        </m:e>
+                        <m:sub>
+                          <m:r>
+                            <a:rPr lang="de-DE" b="0" i="1" smtClean="0">
+                              <a:latin typeface="Cambria Math" panose="02040503050406030204" pitchFamily="18" charset="0"/>
+                            </a:rPr>
+                            <m:t>2</m:t>
+                          </m:r>
+                        </m:sub>
+                      </m:sSub>
+                      <m:r>
+                        <a:rPr lang="de-DE" b="0" i="1" smtClean="0">
+                          <a:latin typeface="Cambria Math" panose="02040503050406030204" pitchFamily="18" charset="0"/>
+                        </a:rPr>
+                        <m:t>   ………   </m:t>
+                      </m:r>
+                      <m:sSub>
+                        <m:sSubPr>
+                          <m:ctrlPr>
+                            <a:rPr lang="de-DE" b="0" i="1" smtClean="0">
+                              <a:latin typeface="Cambria Math" panose="02040503050406030204" pitchFamily="18" charset="0"/>
+                            </a:rPr>
+                          </m:ctrlPr>
+                        </m:sSubPr>
+                        <m:e>
+                          <m:r>
+                            <a:rPr lang="de-DE" b="0" i="1" smtClean="0">
+                              <a:latin typeface="Cambria Math" panose="02040503050406030204" pitchFamily="18" charset="0"/>
+                            </a:rPr>
+                            <m:t>𝑂</m:t>
+                          </m:r>
+                        </m:e>
+                        <m:sub>
+                          <m:r>
+                            <a:rPr lang="de-DE" b="0" i="1" smtClean="0">
+                              <a:latin typeface="Cambria Math" panose="02040503050406030204" pitchFamily="18" charset="0"/>
+                            </a:rPr>
+                            <m:t>𝑁</m:t>
+                          </m:r>
+                        </m:sub>
+                      </m:sSub>
+                    </m:oMath>
+                  </m:oMathPara>
+                </a14:m>
+                <a:endParaRPr lang="en-GB" dirty="0"/>
+              </a:p>
+            </p:txBody>
+          </p:sp>
+        </mc:Choice>
+        <mc:Fallback xmlns="">
+          <p:sp>
+            <p:nvSpPr>
+              <p:cNvPr id="31" name="Rechteck 30">
+                <a:extLst>
+                  <a:ext uri="{FF2B5EF4-FFF2-40B4-BE49-F238E27FC236}">
+                    <a16:creationId xmlns:a16="http://schemas.microsoft.com/office/drawing/2014/main" id="{512D6EEE-A5B3-466E-855F-E9CFE9A00833}"/>
+                  </a:ext>
+                </a:extLst>
+              </p:cNvPr>
+              <p:cNvSpPr>
+                <a:spLocks noRot="1" noChangeAspect="1" noMove="1" noResize="1" noEditPoints="1" noAdjustHandles="1" noChangeArrowheads="1" noChangeShapeType="1" noTextEdit="1"/>
+              </p:cNvSpPr>
+              <p:nvPr/>
+            </p:nvSpPr>
+            <p:spPr>
+              <a:xfrm>
+                <a:off x="6979638" y="3353537"/>
+                <a:ext cx="2192139" cy="430059"/>
+              </a:xfrm>
+              <a:prstGeom prst="rect">
+                <a:avLst/>
+              </a:prstGeom>
+              <a:blipFill>
+                <a:blip r:embed="rId7"/>
+                <a:stretch>
+                  <a:fillRect/>
+                </a:stretch>
+              </a:blipFill>
+            </p:spPr>
+            <p:txBody>
+              <a:bodyPr/>
+              <a:lstStyle/>
+              <a:p>
+                <a:r>
+                  <a:rPr lang="en-GB">
+                    <a:noFill/>
+                  </a:rPr>
+                  <a:t> </a:t>
+                </a:r>
+              </a:p>
+            </p:txBody>
+          </p:sp>
+        </mc:Fallback>
+      </mc:AlternateContent>
+      <p:cxnSp>
+        <p:nvCxnSpPr>
+          <p:cNvPr id="33" name="Gerade Verbindung mit Pfeil 32">
+            <a:extLst>
+              <a:ext uri="{FF2B5EF4-FFF2-40B4-BE49-F238E27FC236}">
+                <a16:creationId xmlns:a16="http://schemas.microsoft.com/office/drawing/2014/main" id="{DFD6872F-0728-4ABA-9B15-982DD456DAD6}"/>
+              </a:ext>
+            </a:extLst>
+          </p:cNvPr>
+          <p:cNvCxnSpPr>
+            <a:cxnSpLocks/>
+          </p:cNvCxnSpPr>
+          <p:nvPr/>
+        </p:nvCxnSpPr>
+        <p:spPr>
+          <a:xfrm>
+            <a:off x="7248088" y="3783596"/>
+            <a:ext cx="0" cy="584400"/>
+          </a:xfrm>
+          <a:prstGeom prst="straightConnector1">
+            <a:avLst/>
+          </a:prstGeom>
+          <a:ln w="25400">
+            <a:tailEnd type="triangle"/>
+          </a:ln>
+        </p:spPr>
+        <p:style>
+          <a:lnRef idx="1">
+            <a:schemeClr val="accent1"/>
+          </a:lnRef>
+          <a:fillRef idx="0">
+            <a:schemeClr val="accent1"/>
+          </a:fillRef>
+          <a:effectRef idx="0">
+            <a:schemeClr val="accent1"/>
+          </a:effectRef>
+          <a:fontRef idx="minor">
+            <a:schemeClr val="tx1"/>
+          </a:fontRef>
+        </p:style>
+      </p:cxnSp>
+      <p:cxnSp>
+        <p:nvCxnSpPr>
+          <p:cNvPr id="37" name="Gerade Verbindung mit Pfeil 36">
+            <a:extLst>
+              <a:ext uri="{FF2B5EF4-FFF2-40B4-BE49-F238E27FC236}">
+                <a16:creationId xmlns:a16="http://schemas.microsoft.com/office/drawing/2014/main" id="{9F76D4EE-4B55-46E2-A037-3924650AE932}"/>
+              </a:ext>
+            </a:extLst>
+          </p:cNvPr>
+          <p:cNvCxnSpPr>
+            <a:cxnSpLocks/>
+          </p:cNvCxnSpPr>
+          <p:nvPr/>
+        </p:nvCxnSpPr>
+        <p:spPr>
+          <a:xfrm>
+            <a:off x="7248088" y="3783596"/>
+            <a:ext cx="343949" cy="584400"/>
+          </a:xfrm>
+          <a:prstGeom prst="straightConnector1">
+            <a:avLst/>
+          </a:prstGeom>
+          <a:ln w="25400">
+            <a:tailEnd type="triangle"/>
+          </a:ln>
+        </p:spPr>
+        <p:style>
+          <a:lnRef idx="1">
+            <a:schemeClr val="accent1"/>
+          </a:lnRef>
+          <a:fillRef idx="0">
+            <a:schemeClr val="accent1"/>
+          </a:fillRef>
+          <a:effectRef idx="0">
+            <a:schemeClr val="accent1"/>
+          </a:effectRef>
+          <a:fontRef idx="minor">
+            <a:schemeClr val="tx1"/>
+          </a:fontRef>
+        </p:style>
+      </p:cxnSp>
+      <p:cxnSp>
+        <p:nvCxnSpPr>
+          <p:cNvPr id="40" name="Gerade Verbindung mit Pfeil 39">
+            <a:extLst>
+              <a:ext uri="{FF2B5EF4-FFF2-40B4-BE49-F238E27FC236}">
+                <a16:creationId xmlns:a16="http://schemas.microsoft.com/office/drawing/2014/main" id="{CEE7C89E-2BA5-406D-B789-789E20B356DD}"/>
+              </a:ext>
+            </a:extLst>
+          </p:cNvPr>
+          <p:cNvCxnSpPr>
+            <a:cxnSpLocks/>
+          </p:cNvCxnSpPr>
+          <p:nvPr/>
+        </p:nvCxnSpPr>
+        <p:spPr>
+          <a:xfrm>
+            <a:off x="7248087" y="3783595"/>
+            <a:ext cx="1524509" cy="584401"/>
+          </a:xfrm>
+          <a:prstGeom prst="straightConnector1">
+            <a:avLst/>
+          </a:prstGeom>
+          <a:ln w="25400">
+            <a:tailEnd type="triangle"/>
+          </a:ln>
+        </p:spPr>
+        <p:style>
+          <a:lnRef idx="1">
+            <a:schemeClr val="accent1"/>
+          </a:lnRef>
+          <a:fillRef idx="0">
+            <a:schemeClr val="accent1"/>
+          </a:fillRef>
+          <a:effectRef idx="0">
+            <a:schemeClr val="accent1"/>
+          </a:effectRef>
+          <a:fontRef idx="minor">
+            <a:schemeClr val="tx1"/>
+          </a:fontRef>
+        </p:style>
+      </p:cxnSp>
+      <p:sp>
+        <p:nvSpPr>
+          <p:cNvPr id="44" name="Textfeld 43">
+            <a:extLst>
+              <a:ext uri="{FF2B5EF4-FFF2-40B4-BE49-F238E27FC236}">
+                <a16:creationId xmlns:a16="http://schemas.microsoft.com/office/drawing/2014/main" id="{A3B89C76-2BD7-4CAD-848D-CE7AE081805A}"/>
+              </a:ext>
+            </a:extLst>
+          </p:cNvPr>
+          <p:cNvSpPr txBox="1"/>
+          <p:nvPr/>
+        </p:nvSpPr>
+        <p:spPr>
+          <a:xfrm>
+            <a:off x="6070603" y="3844963"/>
+            <a:ext cx="924930" cy="461665"/>
+          </a:xfrm>
+          <a:prstGeom prst="rect">
+            <a:avLst/>
+          </a:prstGeom>
+          <a:noFill/>
+        </p:spPr>
+        <p:txBody>
+          <a:bodyPr wrap="square" rtlCol="0">
+            <a:spAutoFit/>
+          </a:bodyPr>
+          <a:lstStyle/>
+          <a:p>
+            <a:r>
+              <a:rPr lang="en-GB" sz="1200" dirty="0">
+                <a:latin typeface="Arial" panose="020B0604020202020204" pitchFamily="34" charset="0"/>
+                <a:cs typeface="Arial" panose="020B0604020202020204" pitchFamily="34" charset="0"/>
+              </a:rPr>
+              <a:t>Top-Down </a:t>
+            </a:r>
+          </a:p>
+          <a:p>
+            <a:r>
+              <a:rPr lang="en-GB" sz="1200" dirty="0" err="1">
+                <a:latin typeface="Arial" panose="020B0604020202020204" pitchFamily="34" charset="0"/>
+                <a:cs typeface="Arial" panose="020B0604020202020204" pitchFamily="34" charset="0"/>
+              </a:rPr>
+              <a:t>Gewichte</a:t>
+            </a:r>
+            <a:endParaRPr lang="en-GB" sz="1200" dirty="0">
+              <a:latin typeface="Arial" panose="020B0604020202020204" pitchFamily="34" charset="0"/>
+              <a:cs typeface="Arial" panose="020B0604020202020204" pitchFamily="34" charset="0"/>
+            </a:endParaRPr>
+          </a:p>
+        </p:txBody>
+      </p:sp>
+      <mc:AlternateContent xmlns:mc="http://schemas.openxmlformats.org/markup-compatibility/2006" xmlns:a14="http://schemas.microsoft.com/office/drawing/2010/main">
+        <mc:Choice Requires="a14">
+          <p:sp>
+            <p:nvSpPr>
+              <p:cNvPr id="45" name="Textfeld 44">
+                <a:extLst>
+                  <a:ext uri="{FF2B5EF4-FFF2-40B4-BE49-F238E27FC236}">
+                    <a16:creationId xmlns:a16="http://schemas.microsoft.com/office/drawing/2014/main" id="{45407BA1-D05C-4A1D-8248-09F66F6F1344}"/>
+                  </a:ext>
+                </a:extLst>
+              </p:cNvPr>
+              <p:cNvSpPr txBox="1"/>
+              <p:nvPr/>
+            </p:nvSpPr>
+            <p:spPr>
+              <a:xfrm>
+                <a:off x="6903766" y="3915910"/>
+                <a:ext cx="420193" cy="291875"/>
+              </a:xfrm>
+              <a:prstGeom prst="rect">
+                <a:avLst/>
+              </a:prstGeom>
+              <a:noFill/>
+            </p:spPr>
+            <p:txBody>
+              <a:bodyPr wrap="square" rtlCol="0">
+                <a:spAutoFit/>
+              </a:bodyPr>
+              <a:lstStyle/>
+              <a:p>
+                <a:pPr/>
+                <a14:m>
+                  <m:oMathPara xmlns:m="http://schemas.openxmlformats.org/officeDocument/2006/math">
+                    <m:oMathParaPr>
+                      <m:jc m:val="centerGroup"/>
+                    </m:oMathParaPr>
+                    <m:oMath xmlns:m="http://schemas.openxmlformats.org/officeDocument/2006/math">
+                      <m:sSub>
+                        <m:sSubPr>
+                          <m:ctrlPr>
+                            <a:rPr lang="de-DE" sz="1200" b="0" i="1" smtClean="0">
+                              <a:latin typeface="Cambria Math" panose="02040503050406030204" pitchFamily="18" charset="0"/>
+                              <a:cs typeface="Arial" panose="020B0604020202020204" pitchFamily="34" charset="0"/>
+                            </a:rPr>
+                          </m:ctrlPr>
+                        </m:sSubPr>
+                        <m:e>
+                          <m:r>
+                            <a:rPr lang="de-DE" sz="1200" b="0" i="1" smtClean="0">
+                              <a:latin typeface="Cambria Math" panose="02040503050406030204" pitchFamily="18" charset="0"/>
+                              <a:cs typeface="Arial" panose="020B0604020202020204" pitchFamily="34" charset="0"/>
+                            </a:rPr>
+                            <m:t>𝑊</m:t>
+                          </m:r>
+                        </m:e>
+                        <m:sub>
+                          <m:r>
+                            <a:rPr lang="de-DE" sz="1200" b="0" i="1" smtClean="0">
+                              <a:latin typeface="Cambria Math" panose="02040503050406030204" pitchFamily="18" charset="0"/>
+                              <a:cs typeface="Arial" panose="020B0604020202020204" pitchFamily="34" charset="0"/>
+                            </a:rPr>
+                            <m:t>𝑗</m:t>
+                          </m:r>
+                          <m:r>
+                            <a:rPr lang="de-DE" sz="1200" b="0" i="1" smtClean="0">
+                              <a:latin typeface="Cambria Math" panose="02040503050406030204" pitchFamily="18" charset="0"/>
+                              <a:cs typeface="Arial" panose="020B0604020202020204" pitchFamily="34" charset="0"/>
+                            </a:rPr>
+                            <m:t>1</m:t>
+                          </m:r>
+                        </m:sub>
+                      </m:sSub>
+                    </m:oMath>
+                  </m:oMathPara>
+                </a14:m>
+                <a:endParaRPr lang="en-GB" sz="1200" dirty="0">
+                  <a:latin typeface="Arial" panose="020B0604020202020204" pitchFamily="34" charset="0"/>
+                  <a:cs typeface="Arial" panose="020B0604020202020204" pitchFamily="34" charset="0"/>
+                </a:endParaRPr>
+              </a:p>
+            </p:txBody>
+          </p:sp>
+        </mc:Choice>
+        <mc:Fallback xmlns="">
+          <p:sp>
+            <p:nvSpPr>
+              <p:cNvPr id="45" name="Textfeld 44">
+                <a:extLst>
+                  <a:ext uri="{FF2B5EF4-FFF2-40B4-BE49-F238E27FC236}">
+                    <a16:creationId xmlns:a16="http://schemas.microsoft.com/office/drawing/2014/main" id="{45407BA1-D05C-4A1D-8248-09F66F6F1344}"/>
+                  </a:ext>
+                </a:extLst>
+              </p:cNvPr>
+              <p:cNvSpPr txBox="1">
+                <a:spLocks noRot="1" noChangeAspect="1" noMove="1" noResize="1" noEditPoints="1" noAdjustHandles="1" noChangeArrowheads="1" noChangeShapeType="1" noTextEdit="1"/>
+              </p:cNvSpPr>
+              <p:nvPr/>
+            </p:nvSpPr>
+            <p:spPr>
+              <a:xfrm>
+                <a:off x="6903766" y="3915910"/>
+                <a:ext cx="420193" cy="291875"/>
+              </a:xfrm>
+              <a:prstGeom prst="rect">
+                <a:avLst/>
+              </a:prstGeom>
+              <a:blipFill>
+                <a:blip r:embed="rId8"/>
+                <a:stretch>
+                  <a:fillRect b="-4167"/>
+                </a:stretch>
+              </a:blipFill>
+            </p:spPr>
+            <p:txBody>
+              <a:bodyPr/>
+              <a:lstStyle/>
+              <a:p>
+                <a:r>
+                  <a:rPr lang="en-GB">
+                    <a:noFill/>
+                  </a:rPr>
+                  <a:t> </a:t>
+                </a:r>
+              </a:p>
+            </p:txBody>
+          </p:sp>
+        </mc:Fallback>
+      </mc:AlternateContent>
+      <mc:AlternateContent xmlns:mc="http://schemas.openxmlformats.org/markup-compatibility/2006" xmlns:a14="http://schemas.microsoft.com/office/drawing/2010/main">
+        <mc:Choice Requires="a14">
+          <p:sp>
+            <p:nvSpPr>
+              <p:cNvPr id="46" name="Textfeld 45">
+                <a:extLst>
+                  <a:ext uri="{FF2B5EF4-FFF2-40B4-BE49-F238E27FC236}">
+                    <a16:creationId xmlns:a16="http://schemas.microsoft.com/office/drawing/2014/main" id="{3B3A0F80-C1FA-46EC-A338-B6D4EE9AB1F8}"/>
+                  </a:ext>
+                </a:extLst>
+              </p:cNvPr>
+              <p:cNvSpPr txBox="1"/>
+              <p:nvPr/>
+            </p:nvSpPr>
+            <p:spPr>
+              <a:xfrm>
+                <a:off x="8176751" y="3917853"/>
+                <a:ext cx="420193" cy="291875"/>
+              </a:xfrm>
+              <a:prstGeom prst="rect">
+                <a:avLst/>
+              </a:prstGeom>
+              <a:noFill/>
+            </p:spPr>
+            <p:txBody>
+              <a:bodyPr wrap="square" rtlCol="0">
+                <a:spAutoFit/>
+              </a:bodyPr>
+              <a:lstStyle/>
+              <a:p>
+                <a:pPr/>
+                <a14:m>
+                  <m:oMathPara xmlns:m="http://schemas.openxmlformats.org/officeDocument/2006/math">
+                    <m:oMathParaPr>
+                      <m:jc m:val="centerGroup"/>
+                    </m:oMathParaPr>
+                    <m:oMath xmlns:m="http://schemas.openxmlformats.org/officeDocument/2006/math">
+                      <m:sSub>
+                        <m:sSubPr>
+                          <m:ctrlPr>
+                            <a:rPr lang="de-DE" sz="1200" b="0" i="1" smtClean="0">
+                              <a:latin typeface="Cambria Math" panose="02040503050406030204" pitchFamily="18" charset="0"/>
+                              <a:cs typeface="Arial" panose="020B0604020202020204" pitchFamily="34" charset="0"/>
+                            </a:rPr>
+                          </m:ctrlPr>
+                        </m:sSubPr>
+                        <m:e>
+                          <m:r>
+                            <a:rPr lang="de-DE" sz="1200" b="0" i="1" smtClean="0">
+                              <a:latin typeface="Cambria Math" panose="02040503050406030204" pitchFamily="18" charset="0"/>
+                              <a:cs typeface="Arial" panose="020B0604020202020204" pitchFamily="34" charset="0"/>
+                            </a:rPr>
+                            <m:t>𝑊</m:t>
+                          </m:r>
+                        </m:e>
+                        <m:sub>
+                          <m:r>
+                            <a:rPr lang="de-DE" sz="1200" b="0" i="1" smtClean="0">
+                              <a:latin typeface="Cambria Math" panose="02040503050406030204" pitchFamily="18" charset="0"/>
+                              <a:cs typeface="Arial" panose="020B0604020202020204" pitchFamily="34" charset="0"/>
+                            </a:rPr>
+                            <m:t>𝑗𝑑</m:t>
+                          </m:r>
+                        </m:sub>
+                      </m:sSub>
+                    </m:oMath>
+                  </m:oMathPara>
+                </a14:m>
+                <a:endParaRPr lang="en-GB" sz="1200" dirty="0">
+                  <a:latin typeface="Arial" panose="020B0604020202020204" pitchFamily="34" charset="0"/>
+                  <a:cs typeface="Arial" panose="020B0604020202020204" pitchFamily="34" charset="0"/>
+                </a:endParaRPr>
+              </a:p>
+            </p:txBody>
+          </p:sp>
+        </mc:Choice>
+        <mc:Fallback xmlns="">
+          <p:sp>
+            <p:nvSpPr>
+              <p:cNvPr id="46" name="Textfeld 45">
+                <a:extLst>
+                  <a:ext uri="{FF2B5EF4-FFF2-40B4-BE49-F238E27FC236}">
+                    <a16:creationId xmlns:a16="http://schemas.microsoft.com/office/drawing/2014/main" id="{3B3A0F80-C1FA-46EC-A338-B6D4EE9AB1F8}"/>
+                  </a:ext>
+                </a:extLst>
+              </p:cNvPr>
+              <p:cNvSpPr txBox="1">
+                <a:spLocks noRot="1" noChangeAspect="1" noMove="1" noResize="1" noEditPoints="1" noAdjustHandles="1" noChangeArrowheads="1" noChangeShapeType="1" noTextEdit="1"/>
+              </p:cNvSpPr>
+              <p:nvPr/>
+            </p:nvSpPr>
+            <p:spPr>
+              <a:xfrm>
+                <a:off x="8176751" y="3917853"/>
+                <a:ext cx="420193" cy="291875"/>
+              </a:xfrm>
+              <a:prstGeom prst="rect">
+                <a:avLst/>
+              </a:prstGeom>
+              <a:blipFill>
+                <a:blip r:embed="rId9"/>
+                <a:stretch>
+                  <a:fillRect b="-2083"/>
+                </a:stretch>
+              </a:blipFill>
+            </p:spPr>
+            <p:txBody>
+              <a:bodyPr/>
+              <a:lstStyle/>
+              <a:p>
+                <a:r>
+                  <a:rPr lang="en-GB">
+                    <a:noFill/>
+                  </a:rPr>
+                  <a:t> </a:t>
+                </a:r>
+              </a:p>
+            </p:txBody>
+          </p:sp>
+        </mc:Fallback>
+      </mc:AlternateContent>
+      <p:sp>
+        <p:nvSpPr>
+          <p:cNvPr id="47" name="Textfeld 46">
+            <a:extLst>
+              <a:ext uri="{FF2B5EF4-FFF2-40B4-BE49-F238E27FC236}">
+                <a16:creationId xmlns:a16="http://schemas.microsoft.com/office/drawing/2014/main" id="{63BC8009-D2A3-48D6-B027-ACCDE03BA5B1}"/>
+              </a:ext>
+            </a:extLst>
+          </p:cNvPr>
+          <p:cNvSpPr txBox="1"/>
+          <p:nvPr/>
+        </p:nvSpPr>
+        <p:spPr>
+          <a:xfrm>
+            <a:off x="5391504" y="3337733"/>
+            <a:ext cx="1588134" cy="461665"/>
+          </a:xfrm>
+          <a:prstGeom prst="rect">
+            <a:avLst/>
+          </a:prstGeom>
+          <a:noFill/>
+        </p:spPr>
+        <p:txBody>
+          <a:bodyPr wrap="square" rtlCol="0">
+            <a:spAutoFit/>
+          </a:bodyPr>
+          <a:lstStyle/>
+          <a:p>
+            <a:r>
+              <a:rPr lang="en-GB" sz="1200" dirty="0" err="1">
+                <a:latin typeface="Arial" panose="020B0604020202020204" pitchFamily="34" charset="0"/>
+                <a:cs typeface="Arial" panose="020B0604020202020204" pitchFamily="34" charset="0"/>
+              </a:rPr>
+              <a:t>Ausgabe</a:t>
+            </a:r>
+            <a:r>
+              <a:rPr lang="en-GB" sz="1200" dirty="0">
+                <a:latin typeface="Arial" panose="020B0604020202020204" pitchFamily="34" charset="0"/>
+                <a:cs typeface="Arial" panose="020B0604020202020204" pitchFamily="34" charset="0"/>
+              </a:rPr>
+              <a:t> </a:t>
+            </a:r>
+            <a:r>
+              <a:rPr lang="en-GB" sz="1200" dirty="0" err="1">
+                <a:latin typeface="Arial" panose="020B0604020202020204" pitchFamily="34" charset="0"/>
+                <a:cs typeface="Arial" panose="020B0604020202020204" pitchFamily="34" charset="0"/>
+              </a:rPr>
+              <a:t>Kategorie</a:t>
+            </a:r>
+            <a:r>
+              <a:rPr lang="en-GB" sz="1200" dirty="0">
+                <a:latin typeface="Arial" panose="020B0604020202020204" pitchFamily="34" charset="0"/>
+                <a:cs typeface="Arial" panose="020B0604020202020204" pitchFamily="34" charset="0"/>
+              </a:rPr>
+              <a:t> </a:t>
+            </a:r>
+          </a:p>
+          <a:p>
+            <a:r>
+              <a:rPr lang="en-GB" sz="1200" dirty="0" err="1">
+                <a:latin typeface="Arial" panose="020B0604020202020204" pitchFamily="34" charset="0"/>
+                <a:cs typeface="Arial" panose="020B0604020202020204" pitchFamily="34" charset="0"/>
+              </a:rPr>
+              <a:t>Schicht</a:t>
+            </a:r>
+            <a:endParaRPr lang="en-GB" sz="1200" dirty="0">
+              <a:latin typeface="Arial" panose="020B0604020202020204" pitchFamily="34" charset="0"/>
+              <a:cs typeface="Arial" panose="020B0604020202020204" pitchFamily="34" charset="0"/>
+            </a:endParaRPr>
+          </a:p>
+        </p:txBody>
+      </p:sp>
+      <mc:AlternateContent xmlns:mc="http://schemas.openxmlformats.org/markup-compatibility/2006" xmlns:a14="http://schemas.microsoft.com/office/drawing/2010/main">
+        <mc:Choice Requires="a14">
+          <p:sp>
+            <p:nvSpPr>
+              <p:cNvPr id="48" name="Rechteck 47">
+                <a:extLst>
+                  <a:ext uri="{FF2B5EF4-FFF2-40B4-BE49-F238E27FC236}">
+                    <a16:creationId xmlns:a16="http://schemas.microsoft.com/office/drawing/2014/main" id="{4129236F-AD14-4BD2-A158-414F64407831}"/>
+                  </a:ext>
+                </a:extLst>
+              </p:cNvPr>
+              <p:cNvSpPr/>
+              <p:nvPr/>
+            </p:nvSpPr>
+            <p:spPr>
+              <a:xfrm>
+                <a:off x="6975443" y="2477617"/>
+                <a:ext cx="2192139" cy="430059"/>
+              </a:xfrm>
+              <a:prstGeom prst="rect">
+                <a:avLst/>
+              </a:prstGeom>
+            </p:spPr>
+            <p:style>
+              <a:lnRef idx="2">
+                <a:schemeClr val="accent1">
+                  <a:shade val="50000"/>
+                </a:schemeClr>
+              </a:lnRef>
+              <a:fillRef idx="1">
+                <a:schemeClr val="accent1"/>
+              </a:fillRef>
+              <a:effectRef idx="0">
+                <a:schemeClr val="accent1"/>
+              </a:effectRef>
+              <a:fontRef idx="minor">
+                <a:schemeClr val="lt1"/>
+              </a:fontRef>
+            </p:style>
+            <p:txBody>
+              <a:bodyPr rtlCol="0" anchor="ctr"/>
+              <a:lstStyle/>
+              <a:p>
+                <a:pPr algn="ctr"/>
+                <a14:m>
+                  <m:oMathPara xmlns:m="http://schemas.openxmlformats.org/officeDocument/2006/math">
+                    <m:oMathParaPr>
+                      <m:jc m:val="centerGroup"/>
+                    </m:oMathParaPr>
+                    <m:oMath xmlns:m="http://schemas.openxmlformats.org/officeDocument/2006/math">
+                      <m:sSub>
+                        <m:sSubPr>
+                          <m:ctrlPr>
+                            <a:rPr lang="de-DE" b="0" i="1" smtClean="0">
+                              <a:latin typeface="Cambria Math" panose="02040503050406030204" pitchFamily="18" charset="0"/>
+                            </a:rPr>
+                          </m:ctrlPr>
+                        </m:sSubPr>
+                        <m:e>
+                          <m:r>
+                            <a:rPr lang="de-DE" b="0" i="1" smtClean="0">
+                              <a:latin typeface="Cambria Math" panose="02040503050406030204" pitchFamily="18" charset="0"/>
+                            </a:rPr>
+                            <m:t>𝐶</m:t>
+                          </m:r>
+                        </m:e>
+                        <m:sub>
+                          <m:r>
+                            <a:rPr lang="de-DE" b="0" i="1" smtClean="0">
+                              <a:latin typeface="Cambria Math" panose="02040503050406030204" pitchFamily="18" charset="0"/>
+                            </a:rPr>
+                            <m:t>1</m:t>
+                          </m:r>
+                        </m:sub>
+                      </m:sSub>
+                      <m:r>
+                        <a:rPr lang="de-DE" b="0" i="1" smtClean="0">
+                          <a:latin typeface="Cambria Math" panose="02040503050406030204" pitchFamily="18" charset="0"/>
+                        </a:rPr>
+                        <m:t>   </m:t>
+                      </m:r>
+                      <m:sSub>
+                        <m:sSubPr>
+                          <m:ctrlPr>
+                            <a:rPr lang="de-DE" b="0" i="1" smtClean="0">
+                              <a:latin typeface="Cambria Math" panose="02040503050406030204" pitchFamily="18" charset="0"/>
+                            </a:rPr>
+                          </m:ctrlPr>
+                        </m:sSubPr>
+                        <m:e>
+                          <m:r>
+                            <a:rPr lang="de-DE" b="0" i="1" smtClean="0">
+                              <a:latin typeface="Cambria Math" panose="02040503050406030204" pitchFamily="18" charset="0"/>
+                            </a:rPr>
+                            <m:t>𝐶</m:t>
+                          </m:r>
+                        </m:e>
+                        <m:sub>
+                          <m:r>
+                            <a:rPr lang="de-DE" b="0" i="1" smtClean="0">
+                              <a:latin typeface="Cambria Math" panose="02040503050406030204" pitchFamily="18" charset="0"/>
+                            </a:rPr>
+                            <m:t>2</m:t>
+                          </m:r>
+                        </m:sub>
+                      </m:sSub>
+                      <m:r>
+                        <a:rPr lang="de-DE" b="0" i="1" smtClean="0">
+                          <a:latin typeface="Cambria Math" panose="02040503050406030204" pitchFamily="18" charset="0"/>
+                        </a:rPr>
+                        <m:t>   ………   </m:t>
+                      </m:r>
+                      <m:sSub>
+                        <m:sSubPr>
+                          <m:ctrlPr>
+                            <a:rPr lang="de-DE" b="0" i="1" smtClean="0">
+                              <a:latin typeface="Cambria Math" panose="02040503050406030204" pitchFamily="18" charset="0"/>
+                            </a:rPr>
+                          </m:ctrlPr>
+                        </m:sSubPr>
+                        <m:e>
+                          <m:r>
+                            <a:rPr lang="de-DE" b="0" i="1" smtClean="0">
+                              <a:latin typeface="Cambria Math" panose="02040503050406030204" pitchFamily="18" charset="0"/>
+                            </a:rPr>
+                            <m:t>𝐶</m:t>
+                          </m:r>
+                        </m:e>
+                        <m:sub>
+                          <m:r>
+                            <a:rPr lang="de-DE" b="0" i="1" smtClean="0">
+                              <a:latin typeface="Cambria Math" panose="02040503050406030204" pitchFamily="18" charset="0"/>
+                            </a:rPr>
+                            <m:t>𝑀</m:t>
+                          </m:r>
+                        </m:sub>
+                      </m:sSub>
+                    </m:oMath>
+                  </m:oMathPara>
+                </a14:m>
+                <a:endParaRPr lang="en-GB" dirty="0"/>
+              </a:p>
+            </p:txBody>
+          </p:sp>
+        </mc:Choice>
+        <mc:Fallback xmlns="">
+          <p:sp>
+            <p:nvSpPr>
+              <p:cNvPr id="48" name="Rechteck 47">
+                <a:extLst>
+                  <a:ext uri="{FF2B5EF4-FFF2-40B4-BE49-F238E27FC236}">
+                    <a16:creationId xmlns:a16="http://schemas.microsoft.com/office/drawing/2014/main" id="{4129236F-AD14-4BD2-A158-414F64407831}"/>
+                  </a:ext>
+                </a:extLst>
+              </p:cNvPr>
+              <p:cNvSpPr>
+                <a:spLocks noRot="1" noChangeAspect="1" noMove="1" noResize="1" noEditPoints="1" noAdjustHandles="1" noChangeArrowheads="1" noChangeShapeType="1" noTextEdit="1"/>
+              </p:cNvSpPr>
+              <p:nvPr/>
+            </p:nvSpPr>
+            <p:spPr>
+              <a:xfrm>
+                <a:off x="6975443" y="2477617"/>
+                <a:ext cx="2192139" cy="430059"/>
+              </a:xfrm>
+              <a:prstGeom prst="rect">
+                <a:avLst/>
+              </a:prstGeom>
+              <a:blipFill>
+                <a:blip r:embed="rId10"/>
+                <a:stretch>
+                  <a:fillRect/>
+                </a:stretch>
+              </a:blipFill>
+            </p:spPr>
+            <p:txBody>
+              <a:bodyPr/>
+              <a:lstStyle/>
+              <a:p>
+                <a:r>
+                  <a:rPr lang="en-GB">
+                    <a:noFill/>
+                  </a:rPr>
+                  <a:t> </a:t>
+                </a:r>
+              </a:p>
+            </p:txBody>
+          </p:sp>
+        </mc:Fallback>
+      </mc:AlternateContent>
+      <p:sp>
+        <p:nvSpPr>
+          <p:cNvPr id="49" name="Textfeld 48">
+            <a:extLst>
+              <a:ext uri="{FF2B5EF4-FFF2-40B4-BE49-F238E27FC236}">
+                <a16:creationId xmlns:a16="http://schemas.microsoft.com/office/drawing/2014/main" id="{EEFB0902-D52A-4686-8E83-2659746B1F4A}"/>
+              </a:ext>
+            </a:extLst>
+          </p:cNvPr>
+          <p:cNvSpPr txBox="1"/>
+          <p:nvPr/>
+        </p:nvSpPr>
+        <p:spPr>
+          <a:xfrm>
+            <a:off x="5601224" y="2554105"/>
+            <a:ext cx="1374219" cy="276999"/>
+          </a:xfrm>
+          <a:prstGeom prst="rect">
+            <a:avLst/>
+          </a:prstGeom>
+          <a:noFill/>
+        </p:spPr>
+        <p:txBody>
+          <a:bodyPr wrap="square" rtlCol="0">
+            <a:spAutoFit/>
+          </a:bodyPr>
+          <a:lstStyle/>
+          <a:p>
+            <a:r>
+              <a:rPr lang="en-GB" sz="1200" dirty="0" err="1">
+                <a:latin typeface="Arial" panose="020B0604020202020204" pitchFamily="34" charset="0"/>
+                <a:cs typeface="Arial" panose="020B0604020202020204" pitchFamily="34" charset="0"/>
+              </a:rPr>
+              <a:t>Kategorie</a:t>
+            </a:r>
+            <a:r>
+              <a:rPr lang="en-GB" sz="1200" dirty="0">
+                <a:latin typeface="Arial" panose="020B0604020202020204" pitchFamily="34" charset="0"/>
+                <a:cs typeface="Arial" panose="020B0604020202020204" pitchFamily="34" charset="0"/>
+              </a:rPr>
+              <a:t> </a:t>
+            </a:r>
+            <a:r>
+              <a:rPr lang="en-GB" sz="1200" dirty="0" err="1">
+                <a:latin typeface="Arial" panose="020B0604020202020204" pitchFamily="34" charset="0"/>
+                <a:cs typeface="Arial" panose="020B0604020202020204" pitchFamily="34" charset="0"/>
+              </a:rPr>
+              <a:t>Schicht</a:t>
+            </a:r>
+            <a:endParaRPr lang="en-GB" sz="1200" dirty="0">
+              <a:latin typeface="Arial" panose="020B0604020202020204" pitchFamily="34" charset="0"/>
+              <a:cs typeface="Arial" panose="020B0604020202020204" pitchFamily="34" charset="0"/>
+            </a:endParaRPr>
+          </a:p>
+        </p:txBody>
+      </p:sp>
+      <p:sp>
+        <p:nvSpPr>
+          <p:cNvPr id="50" name="Textfeld 49">
+            <a:extLst>
+              <a:ext uri="{FF2B5EF4-FFF2-40B4-BE49-F238E27FC236}">
+                <a16:creationId xmlns:a16="http://schemas.microsoft.com/office/drawing/2014/main" id="{4084A8BD-9280-4737-842A-254C5688FB75}"/>
+              </a:ext>
+            </a:extLst>
+          </p:cNvPr>
+          <p:cNvSpPr txBox="1"/>
+          <p:nvPr/>
+        </p:nvSpPr>
+        <p:spPr>
+          <a:xfrm>
+            <a:off x="5391504" y="1752954"/>
+            <a:ext cx="1435741" cy="276999"/>
+          </a:xfrm>
+          <a:prstGeom prst="rect">
+            <a:avLst/>
+          </a:prstGeom>
+          <a:noFill/>
+        </p:spPr>
+        <p:txBody>
+          <a:bodyPr wrap="square" rtlCol="0">
+            <a:spAutoFit/>
+          </a:bodyPr>
+          <a:lstStyle/>
+          <a:p>
+            <a:r>
+              <a:rPr lang="en-GB" sz="1200" dirty="0" err="1">
+                <a:latin typeface="Arial" panose="020B0604020202020204" pitchFamily="34" charset="0"/>
+                <a:cs typeface="Arial" panose="020B0604020202020204" pitchFamily="34" charset="0"/>
+              </a:rPr>
+              <a:t>Eingang</a:t>
+            </a:r>
+            <a:r>
+              <a:rPr lang="en-GB" sz="1200" dirty="0">
+                <a:latin typeface="Arial" panose="020B0604020202020204" pitchFamily="34" charset="0"/>
+                <a:cs typeface="Arial" panose="020B0604020202020204" pitchFamily="34" charset="0"/>
+              </a:rPr>
+              <a:t> </a:t>
+            </a:r>
+            <a:r>
+              <a:rPr lang="en-GB" sz="1200" dirty="0" err="1">
+                <a:latin typeface="Arial" panose="020B0604020202020204" pitchFamily="34" charset="0"/>
+                <a:cs typeface="Arial" panose="020B0604020202020204" pitchFamily="34" charset="0"/>
+              </a:rPr>
+              <a:t>Kategorie</a:t>
+            </a:r>
+            <a:endParaRPr lang="en-GB" sz="1200" dirty="0">
+              <a:latin typeface="Arial" panose="020B0604020202020204" pitchFamily="34" charset="0"/>
+              <a:cs typeface="Arial" panose="020B0604020202020204" pitchFamily="34" charset="0"/>
+            </a:endParaRPr>
+          </a:p>
+        </p:txBody>
+      </p:sp>
+      <p:cxnSp>
+        <p:nvCxnSpPr>
+          <p:cNvPr id="51" name="Gerade Verbindung mit Pfeil 50">
+            <a:extLst>
+              <a:ext uri="{FF2B5EF4-FFF2-40B4-BE49-F238E27FC236}">
+                <a16:creationId xmlns:a16="http://schemas.microsoft.com/office/drawing/2014/main" id="{A4438B5C-24C9-4AA1-A976-2E5666728320}"/>
+              </a:ext>
+            </a:extLst>
+          </p:cNvPr>
+          <p:cNvCxnSpPr>
+            <a:cxnSpLocks/>
+            <a:stCxn id="50" idx="2"/>
+          </p:cNvCxnSpPr>
+          <p:nvPr/>
+        </p:nvCxnSpPr>
+        <p:spPr>
+          <a:xfrm>
+            <a:off x="6109375" y="2029953"/>
+            <a:ext cx="866068" cy="441513"/>
+          </a:xfrm>
+          <a:prstGeom prst="straightConnector1">
+            <a:avLst/>
+          </a:prstGeom>
+          <a:ln w="25400">
+            <a:tailEnd type="triangle"/>
+          </a:ln>
+        </p:spPr>
+        <p:style>
+          <a:lnRef idx="1">
+            <a:schemeClr val="accent1"/>
+          </a:lnRef>
+          <a:fillRef idx="0">
+            <a:schemeClr val="accent1"/>
+          </a:fillRef>
+          <a:effectRef idx="0">
+            <a:schemeClr val="accent1"/>
+          </a:effectRef>
+          <a:fontRef idx="minor">
+            <a:schemeClr val="tx1"/>
+          </a:fontRef>
+        </p:style>
+      </p:cxnSp>
+      <p:cxnSp>
+        <p:nvCxnSpPr>
+          <p:cNvPr id="56" name="Gerade Verbindung mit Pfeil 55">
+            <a:extLst>
+              <a:ext uri="{FF2B5EF4-FFF2-40B4-BE49-F238E27FC236}">
+                <a16:creationId xmlns:a16="http://schemas.microsoft.com/office/drawing/2014/main" id="{612C59EC-EE76-45E8-A269-459D8A18EEC3}"/>
+              </a:ext>
+            </a:extLst>
+          </p:cNvPr>
+          <p:cNvCxnSpPr>
+            <a:cxnSpLocks/>
+          </p:cNvCxnSpPr>
+          <p:nvPr/>
+        </p:nvCxnSpPr>
+        <p:spPr>
+          <a:xfrm flipV="1">
+            <a:off x="7218855" y="2891872"/>
+            <a:ext cx="385191" cy="450350"/>
+          </a:xfrm>
+          <a:prstGeom prst="straightConnector1">
+            <a:avLst/>
+          </a:prstGeom>
+          <a:ln w="25400">
+            <a:tailEnd type="triangle"/>
+          </a:ln>
+        </p:spPr>
+        <p:style>
+          <a:lnRef idx="1">
+            <a:schemeClr val="accent1"/>
+          </a:lnRef>
+          <a:fillRef idx="0">
+            <a:schemeClr val="accent1"/>
+          </a:fillRef>
+          <a:effectRef idx="0">
+            <a:schemeClr val="accent1"/>
+          </a:effectRef>
+          <a:fontRef idx="minor">
+            <a:schemeClr val="tx1"/>
+          </a:fontRef>
+        </p:style>
+      </p:cxnSp>
+      <p:cxnSp>
+        <p:nvCxnSpPr>
+          <p:cNvPr id="59" name="Gerade Verbindung mit Pfeil 58">
+            <a:extLst>
+              <a:ext uri="{FF2B5EF4-FFF2-40B4-BE49-F238E27FC236}">
+                <a16:creationId xmlns:a16="http://schemas.microsoft.com/office/drawing/2014/main" id="{A4B4C19E-57AB-48CA-9F78-326233F53432}"/>
+              </a:ext>
+            </a:extLst>
+          </p:cNvPr>
+          <p:cNvCxnSpPr>
+            <a:cxnSpLocks/>
+          </p:cNvCxnSpPr>
+          <p:nvPr/>
+        </p:nvCxnSpPr>
+        <p:spPr>
+          <a:xfrm flipH="1" flipV="1">
+            <a:off x="7248087" y="2907675"/>
+            <a:ext cx="355960" cy="430059"/>
+          </a:xfrm>
+          <a:prstGeom prst="straightConnector1">
+            <a:avLst/>
+          </a:prstGeom>
+          <a:ln w="25400">
+            <a:tailEnd type="triangle"/>
+          </a:ln>
+        </p:spPr>
+        <p:style>
+          <a:lnRef idx="1">
+            <a:schemeClr val="accent1"/>
+          </a:lnRef>
+          <a:fillRef idx="0">
+            <a:schemeClr val="accent1"/>
+          </a:fillRef>
+          <a:effectRef idx="0">
+            <a:schemeClr val="accent1"/>
+          </a:effectRef>
+          <a:fontRef idx="minor">
+            <a:schemeClr val="tx1"/>
+          </a:fontRef>
+        </p:style>
+      </p:cxnSp>
+      <p:cxnSp>
+        <p:nvCxnSpPr>
+          <p:cNvPr id="61" name="Gerade Verbindung mit Pfeil 60">
+            <a:extLst>
+              <a:ext uri="{FF2B5EF4-FFF2-40B4-BE49-F238E27FC236}">
+                <a16:creationId xmlns:a16="http://schemas.microsoft.com/office/drawing/2014/main" id="{B289BE39-56B2-469C-9E52-94224D4E8C85}"/>
+              </a:ext>
+            </a:extLst>
+          </p:cNvPr>
+          <p:cNvCxnSpPr>
+            <a:cxnSpLocks/>
+          </p:cNvCxnSpPr>
+          <p:nvPr/>
+        </p:nvCxnSpPr>
+        <p:spPr>
+          <a:xfrm flipV="1">
+            <a:off x="8772597" y="2907676"/>
+            <a:ext cx="0" cy="430059"/>
+          </a:xfrm>
+          <a:prstGeom prst="straightConnector1">
+            <a:avLst/>
+          </a:prstGeom>
+          <a:ln w="25400">
+            <a:tailEnd type="triangle"/>
+          </a:ln>
+        </p:spPr>
+        <p:style>
+          <a:lnRef idx="1">
+            <a:schemeClr val="accent1"/>
+          </a:lnRef>
+          <a:fillRef idx="0">
+            <a:schemeClr val="accent1"/>
+          </a:fillRef>
+          <a:effectRef idx="0">
+            <a:schemeClr val="accent1"/>
+          </a:effectRef>
+          <a:fontRef idx="minor">
+            <a:schemeClr val="tx1"/>
+          </a:fontRef>
+        </p:style>
+      </p:cxnSp>
+      <mc:AlternateContent xmlns:mc="http://schemas.openxmlformats.org/markup-compatibility/2006" xmlns:a14="http://schemas.microsoft.com/office/drawing/2010/main">
+        <mc:Choice Requires="a14">
+          <p:sp>
+            <p:nvSpPr>
+              <p:cNvPr id="69" name="Ellipse 68">
+                <a:extLst>
+                  <a:ext uri="{FF2B5EF4-FFF2-40B4-BE49-F238E27FC236}">
+                    <a16:creationId xmlns:a16="http://schemas.microsoft.com/office/drawing/2014/main" id="{A0F2CCA9-78BC-454B-822F-8CA2F113E4D1}"/>
+                  </a:ext>
+                </a:extLst>
+              </p:cNvPr>
+              <p:cNvSpPr/>
+              <p:nvPr/>
+            </p:nvSpPr>
+            <p:spPr>
+              <a:xfrm>
+                <a:off x="9988216" y="3414188"/>
+                <a:ext cx="343941" cy="308754"/>
+              </a:xfrm>
+              <a:prstGeom prst="ellipse">
+                <a:avLst/>
+              </a:prstGeom>
+            </p:spPr>
+            <p:style>
+              <a:lnRef idx="2">
+                <a:schemeClr val="accent1">
+                  <a:shade val="50000"/>
+                </a:schemeClr>
+              </a:lnRef>
+              <a:fillRef idx="1">
+                <a:schemeClr val="accent1"/>
+              </a:fillRef>
+              <a:effectRef idx="0">
+                <a:schemeClr val="accent1"/>
+              </a:effectRef>
+              <a:fontRef idx="minor">
+                <a:schemeClr val="lt1"/>
+              </a:fontRef>
+            </p:style>
+            <p:txBody>
+              <a:bodyPr rtlCol="0" anchor="ctr"/>
+              <a:lstStyle/>
+              <a:p>
+                <a:pPr algn="ctr"/>
+                <a14:m>
+                  <m:oMathPara xmlns:m="http://schemas.openxmlformats.org/officeDocument/2006/math">
+                    <m:oMathParaPr>
+                      <m:jc m:val="centerGroup"/>
+                    </m:oMathParaPr>
+                    <m:oMath xmlns:m="http://schemas.openxmlformats.org/officeDocument/2006/math">
+                      <m:r>
+                        <a:rPr lang="de-DE" b="0" i="1" smtClean="0">
+                          <a:latin typeface="Cambria Math" panose="02040503050406030204" pitchFamily="18" charset="0"/>
+                        </a:rPr>
+                        <m:t>𝜌</m:t>
+                      </m:r>
+                    </m:oMath>
+                  </m:oMathPara>
+                </a14:m>
+                <a:endParaRPr lang="en-GB" dirty="0"/>
+              </a:p>
+            </p:txBody>
+          </p:sp>
+        </mc:Choice>
+        <mc:Fallback xmlns="">
+          <p:sp>
+            <p:nvSpPr>
+              <p:cNvPr id="69" name="Ellipse 68">
+                <a:extLst>
+                  <a:ext uri="{FF2B5EF4-FFF2-40B4-BE49-F238E27FC236}">
+                    <a16:creationId xmlns:a16="http://schemas.microsoft.com/office/drawing/2014/main" id="{A0F2CCA9-78BC-454B-822F-8CA2F113E4D1}"/>
+                  </a:ext>
+                </a:extLst>
+              </p:cNvPr>
+              <p:cNvSpPr>
+                <a:spLocks noRot="1" noChangeAspect="1" noMove="1" noResize="1" noEditPoints="1" noAdjustHandles="1" noChangeArrowheads="1" noChangeShapeType="1" noTextEdit="1"/>
+              </p:cNvSpPr>
+              <p:nvPr/>
+            </p:nvSpPr>
+            <p:spPr>
+              <a:xfrm>
+                <a:off x="9988216" y="3414188"/>
+                <a:ext cx="343941" cy="308754"/>
+              </a:xfrm>
+              <a:prstGeom prst="ellipse">
+                <a:avLst/>
+              </a:prstGeom>
+              <a:blipFill>
+                <a:blip r:embed="rId11"/>
+                <a:stretch>
+                  <a:fillRect b="-15094"/>
+                </a:stretch>
+              </a:blipFill>
+            </p:spPr>
+            <p:txBody>
+              <a:bodyPr/>
+              <a:lstStyle/>
+              <a:p>
+                <a:r>
+                  <a:rPr lang="en-GB">
+                    <a:noFill/>
+                  </a:rPr>
+                  <a:t> </a:t>
+                </a:r>
+              </a:p>
+            </p:txBody>
+          </p:sp>
+        </mc:Fallback>
+      </mc:AlternateContent>
+      <p:cxnSp>
+        <p:nvCxnSpPr>
+          <p:cNvPr id="71" name="Verbinder: gewinkelt 70">
+            <a:extLst>
+              <a:ext uri="{FF2B5EF4-FFF2-40B4-BE49-F238E27FC236}">
+                <a16:creationId xmlns:a16="http://schemas.microsoft.com/office/drawing/2014/main" id="{39E01F96-BF95-4EB9-8952-0E0FC2CE0A5F}"/>
+              </a:ext>
+            </a:extLst>
+          </p:cNvPr>
+          <p:cNvCxnSpPr>
+            <a:stCxn id="48" idx="3"/>
+            <a:endCxn id="69" idx="0"/>
+          </p:cNvCxnSpPr>
+          <p:nvPr/>
+        </p:nvCxnSpPr>
+        <p:spPr>
+          <a:xfrm>
+            <a:off x="9167582" y="2692647"/>
+            <a:ext cx="992605" cy="721541"/>
+          </a:xfrm>
+          <a:prstGeom prst="bentConnector2">
+            <a:avLst/>
+          </a:prstGeom>
+          <a:ln w="25400">
+            <a:tailEnd type="triangle"/>
+          </a:ln>
+        </p:spPr>
+        <p:style>
+          <a:lnRef idx="1">
+            <a:schemeClr val="accent1"/>
+          </a:lnRef>
+          <a:fillRef idx="0">
+            <a:schemeClr val="accent1"/>
+          </a:fillRef>
+          <a:effectRef idx="0">
+            <a:schemeClr val="accent1"/>
+          </a:effectRef>
+          <a:fontRef idx="minor">
+            <a:schemeClr val="tx1"/>
+          </a:fontRef>
+        </p:style>
+      </p:cxnSp>
+      <p:cxnSp>
+        <p:nvCxnSpPr>
+          <p:cNvPr id="72" name="Gerade Verbindung mit Pfeil 71">
+            <a:extLst>
+              <a:ext uri="{FF2B5EF4-FFF2-40B4-BE49-F238E27FC236}">
+                <a16:creationId xmlns:a16="http://schemas.microsoft.com/office/drawing/2014/main" id="{E217C801-D307-424B-829F-F250D3C1C713}"/>
+              </a:ext>
+            </a:extLst>
+          </p:cNvPr>
+          <p:cNvCxnSpPr>
+            <a:cxnSpLocks/>
+            <a:stCxn id="69" idx="2"/>
+            <a:endCxn id="31" idx="3"/>
+          </p:cNvCxnSpPr>
+          <p:nvPr/>
+        </p:nvCxnSpPr>
+        <p:spPr>
+          <a:xfrm flipH="1">
+            <a:off x="9171777" y="3568565"/>
+            <a:ext cx="816439" cy="2"/>
+          </a:xfrm>
+          <a:prstGeom prst="straightConnector1">
+            <a:avLst/>
+          </a:prstGeom>
+          <a:ln w="25400">
+            <a:tailEnd type="triangle"/>
+          </a:ln>
+        </p:spPr>
+        <p:style>
+          <a:lnRef idx="1">
+            <a:schemeClr val="accent1"/>
+          </a:lnRef>
+          <a:fillRef idx="0">
+            <a:schemeClr val="accent1"/>
+          </a:fillRef>
+          <a:effectRef idx="0">
+            <a:schemeClr val="accent1"/>
+          </a:effectRef>
+          <a:fontRef idx="minor">
+            <a:schemeClr val="tx1"/>
+          </a:fontRef>
+        </p:style>
+      </p:cxnSp>
+      <p:sp>
+        <p:nvSpPr>
+          <p:cNvPr id="75" name="Textfeld 74">
+            <a:extLst>
+              <a:ext uri="{FF2B5EF4-FFF2-40B4-BE49-F238E27FC236}">
+                <a16:creationId xmlns:a16="http://schemas.microsoft.com/office/drawing/2014/main" id="{35EB1AE0-95B3-49E8-B304-D8334F256370}"/>
+              </a:ext>
+            </a:extLst>
+          </p:cNvPr>
+          <p:cNvSpPr txBox="1"/>
+          <p:nvPr/>
+        </p:nvSpPr>
+        <p:spPr>
+          <a:xfrm>
+            <a:off x="9358915" y="3584442"/>
+            <a:ext cx="737213" cy="461665"/>
+          </a:xfrm>
+          <a:prstGeom prst="rect">
+            <a:avLst/>
+          </a:prstGeom>
+          <a:noFill/>
+        </p:spPr>
+        <p:txBody>
+          <a:bodyPr wrap="square" rtlCol="0">
+            <a:spAutoFit/>
+          </a:bodyPr>
+          <a:lstStyle/>
+          <a:p>
+            <a:r>
+              <a:rPr lang="en-GB" sz="1200" dirty="0">
+                <a:latin typeface="Arial" panose="020B0604020202020204" pitchFamily="34" charset="0"/>
+                <a:cs typeface="Arial" panose="020B0604020202020204" pitchFamily="34" charset="0"/>
+              </a:rPr>
+              <a:t>Nothing I Know</a:t>
+            </a:r>
+          </a:p>
+        </p:txBody>
+      </p:sp>
+      <p:sp>
+        <p:nvSpPr>
+          <p:cNvPr id="76" name="Textfeld 75">
+            <a:extLst>
+              <a:ext uri="{FF2B5EF4-FFF2-40B4-BE49-F238E27FC236}">
+                <a16:creationId xmlns:a16="http://schemas.microsoft.com/office/drawing/2014/main" id="{0414F304-F19F-41C5-839E-A300215A033C}"/>
+              </a:ext>
+            </a:extLst>
+          </p:cNvPr>
+          <p:cNvSpPr txBox="1"/>
+          <p:nvPr/>
+        </p:nvSpPr>
+        <p:spPr>
+          <a:xfrm>
+            <a:off x="10148368" y="2923481"/>
+            <a:ext cx="812174" cy="276999"/>
+          </a:xfrm>
+          <a:prstGeom prst="rect">
+            <a:avLst/>
+          </a:prstGeom>
+          <a:noFill/>
+        </p:spPr>
+        <p:txBody>
+          <a:bodyPr wrap="square" rtlCol="0">
+            <a:spAutoFit/>
+          </a:bodyPr>
+          <a:lstStyle/>
+          <a:p>
+            <a:r>
+              <a:rPr lang="en-GB" sz="1200" dirty="0">
+                <a:latin typeface="Arial" panose="020B0604020202020204" pitchFamily="34" charset="0"/>
+                <a:cs typeface="Arial" panose="020B0604020202020204" pitchFamily="34" charset="0"/>
+              </a:rPr>
+              <a:t>Matching</a:t>
+            </a:r>
+          </a:p>
+        </p:txBody>
+      </p:sp>
+      <p:cxnSp>
+        <p:nvCxnSpPr>
+          <p:cNvPr id="77" name="Gerade Verbindung mit Pfeil 76">
+            <a:extLst>
+              <a:ext uri="{FF2B5EF4-FFF2-40B4-BE49-F238E27FC236}">
+                <a16:creationId xmlns:a16="http://schemas.microsoft.com/office/drawing/2014/main" id="{ABE77B3B-70EB-4240-B3CE-BEE2E2139321}"/>
+              </a:ext>
+            </a:extLst>
+          </p:cNvPr>
+          <p:cNvCxnSpPr>
+            <a:cxnSpLocks/>
+            <a:stCxn id="69" idx="6"/>
+          </p:cNvCxnSpPr>
+          <p:nvPr/>
+        </p:nvCxnSpPr>
+        <p:spPr>
+          <a:xfrm>
+            <a:off x="10332157" y="3568565"/>
+            <a:ext cx="628385" cy="0"/>
+          </a:xfrm>
+          <a:prstGeom prst="straightConnector1">
+            <a:avLst/>
+          </a:prstGeom>
+          <a:ln w="25400">
+            <a:tailEnd type="triangle"/>
+          </a:ln>
+        </p:spPr>
+        <p:style>
+          <a:lnRef idx="1">
+            <a:schemeClr val="accent1"/>
+          </a:lnRef>
+          <a:fillRef idx="0">
+            <a:schemeClr val="accent1"/>
+          </a:fillRef>
+          <a:effectRef idx="0">
+            <a:schemeClr val="accent1"/>
+          </a:effectRef>
+          <a:fontRef idx="minor">
+            <a:schemeClr val="tx1"/>
+          </a:fontRef>
+        </p:style>
+      </p:cxnSp>
+      <p:sp>
+        <p:nvSpPr>
+          <p:cNvPr id="80" name="Textfeld 79">
+            <a:extLst>
+              <a:ext uri="{FF2B5EF4-FFF2-40B4-BE49-F238E27FC236}">
+                <a16:creationId xmlns:a16="http://schemas.microsoft.com/office/drawing/2014/main" id="{632AF8F4-C4AC-4FFD-9480-9D1DBA89E5F3}"/>
+              </a:ext>
+            </a:extLst>
+          </p:cNvPr>
+          <p:cNvSpPr txBox="1"/>
+          <p:nvPr/>
+        </p:nvSpPr>
+        <p:spPr>
+          <a:xfrm>
+            <a:off x="10271796" y="3580125"/>
+            <a:ext cx="976229" cy="461665"/>
+          </a:xfrm>
+          <a:prstGeom prst="rect">
+            <a:avLst/>
+          </a:prstGeom>
+          <a:noFill/>
+        </p:spPr>
+        <p:txBody>
+          <a:bodyPr wrap="square" rtlCol="0">
+            <a:spAutoFit/>
+          </a:bodyPr>
+          <a:lstStyle/>
+          <a:p>
+            <a:r>
+              <a:rPr lang="en-GB" sz="1200" dirty="0" err="1">
+                <a:latin typeface="Arial" panose="020B0604020202020204" pitchFamily="34" charset="0"/>
+                <a:cs typeface="Arial" panose="020B0604020202020204" pitchFamily="34" charset="0"/>
+              </a:rPr>
+              <a:t>Ausgabe</a:t>
+            </a:r>
+            <a:r>
+              <a:rPr lang="en-GB" sz="1200" dirty="0">
+                <a:latin typeface="Arial" panose="020B0604020202020204" pitchFamily="34" charset="0"/>
+                <a:cs typeface="Arial" panose="020B0604020202020204" pitchFamily="34" charset="0"/>
+              </a:rPr>
+              <a:t> </a:t>
+            </a:r>
+            <a:r>
+              <a:rPr lang="en-GB" sz="1200" dirty="0" err="1">
+                <a:latin typeface="Arial" panose="020B0604020202020204" pitchFamily="34" charset="0"/>
+                <a:cs typeface="Arial" panose="020B0604020202020204" pitchFamily="34" charset="0"/>
+              </a:rPr>
+              <a:t>Kategorie</a:t>
+            </a:r>
+            <a:endParaRPr lang="en-GB" sz="1200" dirty="0">
+              <a:latin typeface="Arial" panose="020B0604020202020204" pitchFamily="34" charset="0"/>
+              <a:cs typeface="Arial" panose="020B0604020202020204" pitchFamily="34" charset="0"/>
+            </a:endParaRPr>
+          </a:p>
+        </p:txBody>
+      </p:sp>
     </p:spTree>
     <p:extLst>
       <p:ext uri="{BB962C8B-B14F-4D97-AF65-F5344CB8AC3E}">
         <p14:creationId xmlns:p14="http://schemas.microsoft.com/office/powerpoint/2010/main" val="2755288229"/>
+      </p:ext>
+    </p:extLst>
+  </p:cSld>
+  <p:clrMapOvr>
+    <a:masterClrMapping/>
+  </p:clrMapOvr>
+</p:sld>
+</file>
+
+<file path=ppt/slides/slide8.xml><?xml version="1.0" encoding="utf-8"?>
+<p:sld xmlns:a="http://schemas.openxmlformats.org/drawingml/2006/main" xmlns:r="http://schemas.openxmlformats.org/officeDocument/2006/relationships" xmlns:p="http://schemas.openxmlformats.org/presentationml/2006/main">
+  <p:cSld>
+    <p:spTree>
+      <p:nvGrpSpPr>
+        <p:cNvPr id="1" name=""/>
+        <p:cNvGrpSpPr/>
+        <p:nvPr/>
+      </p:nvGrpSpPr>
+      <p:grpSpPr>
+        <a:xfrm>
+          <a:off x="0" y="0"/>
+          <a:ext cx="0" cy="0"/>
+          <a:chOff x="0" y="0"/>
+          <a:chExt cx="0" cy="0"/>
+        </a:xfrm>
+      </p:grpSpPr>
+      <p:sp>
+        <p:nvSpPr>
+          <p:cNvPr id="4" name="Rechteck: abgerundete Ecken 3">
+            <a:extLst>
+              <a:ext uri="{FF2B5EF4-FFF2-40B4-BE49-F238E27FC236}">
+                <a16:creationId xmlns:a16="http://schemas.microsoft.com/office/drawing/2014/main" id="{175D130D-0BE8-4597-905E-22112BDD4A9C}"/>
+              </a:ext>
+            </a:extLst>
+          </p:cNvPr>
+          <p:cNvSpPr/>
+          <p:nvPr/>
+        </p:nvSpPr>
+        <p:spPr>
+          <a:xfrm>
+            <a:off x="1546957" y="1457214"/>
+            <a:ext cx="1751163" cy="2296241"/>
+          </a:xfrm>
+          <a:prstGeom prst="roundRect">
+            <a:avLst/>
+          </a:prstGeom>
+          <a:noFill/>
+        </p:spPr>
+        <p:style>
+          <a:lnRef idx="2">
+            <a:schemeClr val="accent1">
+              <a:shade val="50000"/>
+            </a:schemeClr>
+          </a:lnRef>
+          <a:fillRef idx="1">
+            <a:schemeClr val="accent1"/>
+          </a:fillRef>
+          <a:effectRef idx="0">
+            <a:schemeClr val="accent1"/>
+          </a:effectRef>
+          <a:fontRef idx="minor">
+            <a:schemeClr val="lt1"/>
+          </a:fontRef>
+        </p:style>
+        <p:txBody>
+          <a:bodyPr rtlCol="0" anchor="ctr"/>
+          <a:lstStyle/>
+          <a:p>
+            <a:pPr algn="ctr"/>
+            <a:endParaRPr lang="en-GB" sz="1200" dirty="0">
+              <a:latin typeface="Arial" panose="020B0604020202020204" pitchFamily="34" charset="0"/>
+              <a:cs typeface="Arial" panose="020B0604020202020204" pitchFamily="34" charset="0"/>
+            </a:endParaRPr>
+          </a:p>
+        </p:txBody>
+      </p:sp>
+      <p:cxnSp>
+        <p:nvCxnSpPr>
+          <p:cNvPr id="5" name="Gerade Verbindung mit Pfeil 4">
+            <a:extLst>
+              <a:ext uri="{FF2B5EF4-FFF2-40B4-BE49-F238E27FC236}">
+                <a16:creationId xmlns:a16="http://schemas.microsoft.com/office/drawing/2014/main" id="{A609AEEF-9B31-4FBC-9AE1-02E7193A4523}"/>
+              </a:ext>
+            </a:extLst>
+          </p:cNvPr>
+          <p:cNvCxnSpPr>
+            <a:cxnSpLocks/>
+            <a:stCxn id="6" idx="0"/>
+            <a:endCxn id="8" idx="2"/>
+          </p:cNvCxnSpPr>
+          <p:nvPr/>
+        </p:nvCxnSpPr>
+        <p:spPr>
+          <a:xfrm flipV="1">
+            <a:off x="2416727" y="3654723"/>
+            <a:ext cx="804" cy="508091"/>
+          </a:xfrm>
+          <a:prstGeom prst="straightConnector1">
+            <a:avLst/>
+          </a:prstGeom>
+          <a:ln w="25400">
+            <a:tailEnd type="triangle"/>
+          </a:ln>
+        </p:spPr>
+        <p:style>
+          <a:lnRef idx="1">
+            <a:schemeClr val="accent1"/>
+          </a:lnRef>
+          <a:fillRef idx="0">
+            <a:schemeClr val="accent1"/>
+          </a:fillRef>
+          <a:effectRef idx="0">
+            <a:schemeClr val="accent1"/>
+          </a:effectRef>
+          <a:fontRef idx="minor">
+            <a:schemeClr val="tx1"/>
+          </a:fontRef>
+        </p:style>
+      </p:cxnSp>
+      <p:sp>
+        <p:nvSpPr>
+          <p:cNvPr id="6" name="Textfeld 5">
+            <a:extLst>
+              <a:ext uri="{FF2B5EF4-FFF2-40B4-BE49-F238E27FC236}">
+                <a16:creationId xmlns:a16="http://schemas.microsoft.com/office/drawing/2014/main" id="{CF4C36DC-78C2-4C22-A2C2-334CAC7F4E56}"/>
+              </a:ext>
+            </a:extLst>
+          </p:cNvPr>
+          <p:cNvSpPr txBox="1"/>
+          <p:nvPr/>
+        </p:nvSpPr>
+        <p:spPr>
+          <a:xfrm>
+            <a:off x="1946534" y="4162814"/>
+            <a:ext cx="940385" cy="276999"/>
+          </a:xfrm>
+          <a:prstGeom prst="rect">
+            <a:avLst/>
+          </a:prstGeom>
+          <a:noFill/>
+        </p:spPr>
+        <p:txBody>
+          <a:bodyPr wrap="square" rtlCol="0">
+            <a:spAutoFit/>
+          </a:bodyPr>
+          <a:lstStyle/>
+          <a:p>
+            <a:r>
+              <a:rPr lang="de-DE" sz="1200" dirty="0">
+                <a:latin typeface="Arial" panose="020B0604020202020204" pitchFamily="34" charset="0"/>
+                <a:cs typeface="Arial" panose="020B0604020202020204" pitchFamily="34" charset="0"/>
+              </a:rPr>
+              <a:t>224x224x3</a:t>
+            </a:r>
+          </a:p>
+        </p:txBody>
+      </p:sp>
+      <p:sp>
+        <p:nvSpPr>
+          <p:cNvPr id="7" name="Textfeld 6">
+            <a:extLst>
+              <a:ext uri="{FF2B5EF4-FFF2-40B4-BE49-F238E27FC236}">
+                <a16:creationId xmlns:a16="http://schemas.microsoft.com/office/drawing/2014/main" id="{61EC9D9A-D77E-44FB-B20D-33C83910A5AD}"/>
+              </a:ext>
+            </a:extLst>
+          </p:cNvPr>
+          <p:cNvSpPr txBox="1"/>
+          <p:nvPr/>
+        </p:nvSpPr>
+        <p:spPr>
+          <a:xfrm>
+            <a:off x="3594636" y="1758024"/>
+            <a:ext cx="900870" cy="461665"/>
+          </a:xfrm>
+          <a:prstGeom prst="rect">
+            <a:avLst/>
+          </a:prstGeom>
+          <a:noFill/>
+        </p:spPr>
+        <p:txBody>
+          <a:bodyPr wrap="square" rtlCol="0">
+            <a:spAutoFit/>
+          </a:bodyPr>
+          <a:lstStyle/>
+          <a:p>
+            <a:r>
+              <a:rPr lang="de-DE" sz="1200" dirty="0">
+                <a:latin typeface="Arial" panose="020B0604020202020204" pitchFamily="34" charset="0"/>
+                <a:cs typeface="Arial" panose="020B0604020202020204" pitchFamily="34" charset="0"/>
+              </a:rPr>
+              <a:t>1x1x1024Features</a:t>
+            </a:r>
+          </a:p>
+        </p:txBody>
+      </p:sp>
+      <p:sp>
+        <p:nvSpPr>
+          <p:cNvPr id="8" name="Rechteck 7">
+            <a:extLst>
+              <a:ext uri="{FF2B5EF4-FFF2-40B4-BE49-F238E27FC236}">
+                <a16:creationId xmlns:a16="http://schemas.microsoft.com/office/drawing/2014/main" id="{B22C5EE0-1C3D-4575-A40C-A9BABB46E70E}"/>
+              </a:ext>
+            </a:extLst>
+          </p:cNvPr>
+          <p:cNvSpPr/>
+          <p:nvPr/>
+        </p:nvSpPr>
+        <p:spPr>
+          <a:xfrm>
+            <a:off x="1702234" y="3330259"/>
+            <a:ext cx="1430594" cy="324464"/>
+          </a:xfrm>
+          <a:prstGeom prst="rect">
+            <a:avLst/>
+          </a:prstGeom>
+        </p:spPr>
+        <p:style>
+          <a:lnRef idx="2">
+            <a:schemeClr val="accent1">
+              <a:shade val="50000"/>
+            </a:schemeClr>
+          </a:lnRef>
+          <a:fillRef idx="1">
+            <a:schemeClr val="accent1"/>
+          </a:fillRef>
+          <a:effectRef idx="0">
+            <a:schemeClr val="accent1"/>
+          </a:effectRef>
+          <a:fontRef idx="minor">
+            <a:schemeClr val="lt1"/>
+          </a:fontRef>
+        </p:style>
+        <p:txBody>
+          <a:bodyPr rtlCol="0" anchor="ctr"/>
+          <a:lstStyle/>
+          <a:p>
+            <a:pPr algn="ctr"/>
+            <a:endParaRPr lang="en-GB"/>
+          </a:p>
+        </p:txBody>
+      </p:sp>
+      <p:sp>
+        <p:nvSpPr>
+          <p:cNvPr id="9" name="Rechteck 8">
+            <a:extLst>
+              <a:ext uri="{FF2B5EF4-FFF2-40B4-BE49-F238E27FC236}">
+                <a16:creationId xmlns:a16="http://schemas.microsoft.com/office/drawing/2014/main" id="{17BED446-9DAF-4A79-803E-EDD15F155D7C}"/>
+              </a:ext>
+            </a:extLst>
+          </p:cNvPr>
+          <p:cNvSpPr/>
+          <p:nvPr/>
+        </p:nvSpPr>
+        <p:spPr>
+          <a:xfrm>
+            <a:off x="1701431" y="2752811"/>
+            <a:ext cx="1430594" cy="324464"/>
+          </a:xfrm>
+          <a:prstGeom prst="rect">
+            <a:avLst/>
+          </a:prstGeom>
+        </p:spPr>
+        <p:style>
+          <a:lnRef idx="2">
+            <a:schemeClr val="accent1">
+              <a:shade val="50000"/>
+            </a:schemeClr>
+          </a:lnRef>
+          <a:fillRef idx="1">
+            <a:schemeClr val="accent1"/>
+          </a:fillRef>
+          <a:effectRef idx="0">
+            <a:schemeClr val="accent1"/>
+          </a:effectRef>
+          <a:fontRef idx="minor">
+            <a:schemeClr val="lt1"/>
+          </a:fontRef>
+        </p:style>
+        <p:txBody>
+          <a:bodyPr rtlCol="0" anchor="ctr"/>
+          <a:lstStyle/>
+          <a:p>
+            <a:pPr algn="ctr"/>
+            <a:endParaRPr lang="en-GB"/>
+          </a:p>
+        </p:txBody>
+      </p:sp>
+      <p:sp>
+        <p:nvSpPr>
+          <p:cNvPr id="11" name="Rechteck 10">
+            <a:extLst>
+              <a:ext uri="{FF2B5EF4-FFF2-40B4-BE49-F238E27FC236}">
+                <a16:creationId xmlns:a16="http://schemas.microsoft.com/office/drawing/2014/main" id="{C4267197-74DF-4F0B-8912-A964645C0580}"/>
+              </a:ext>
+            </a:extLst>
+          </p:cNvPr>
+          <p:cNvSpPr/>
+          <p:nvPr/>
+        </p:nvSpPr>
+        <p:spPr>
+          <a:xfrm>
+            <a:off x="1701431" y="1595792"/>
+            <a:ext cx="1430594" cy="324464"/>
+          </a:xfrm>
+          <a:prstGeom prst="rect">
+            <a:avLst/>
+          </a:prstGeom>
+        </p:spPr>
+        <p:style>
+          <a:lnRef idx="2">
+            <a:schemeClr val="accent1">
+              <a:shade val="50000"/>
+            </a:schemeClr>
+          </a:lnRef>
+          <a:fillRef idx="1">
+            <a:schemeClr val="accent1"/>
+          </a:fillRef>
+          <a:effectRef idx="0">
+            <a:schemeClr val="accent1"/>
+          </a:effectRef>
+          <a:fontRef idx="minor">
+            <a:schemeClr val="lt1"/>
+          </a:fontRef>
+        </p:style>
+        <p:txBody>
+          <a:bodyPr rtlCol="0" anchor="ctr"/>
+          <a:lstStyle/>
+          <a:p>
+            <a:pPr algn="ctr"/>
+            <a:endParaRPr lang="en-GB"/>
+          </a:p>
+        </p:txBody>
+      </p:sp>
+      <p:cxnSp>
+        <p:nvCxnSpPr>
+          <p:cNvPr id="13" name="Gerade Verbindung mit Pfeil 12">
+            <a:extLst>
+              <a:ext uri="{FF2B5EF4-FFF2-40B4-BE49-F238E27FC236}">
+                <a16:creationId xmlns:a16="http://schemas.microsoft.com/office/drawing/2014/main" id="{C73D9908-5313-4ACC-A97B-7DE9FD4184A9}"/>
+              </a:ext>
+            </a:extLst>
+          </p:cNvPr>
+          <p:cNvCxnSpPr>
+            <a:cxnSpLocks/>
+            <a:stCxn id="8" idx="0"/>
+            <a:endCxn id="9" idx="2"/>
+          </p:cNvCxnSpPr>
+          <p:nvPr/>
+        </p:nvCxnSpPr>
+        <p:spPr>
+          <a:xfrm flipH="1" flipV="1">
+            <a:off x="2416728" y="3077275"/>
+            <a:ext cx="803" cy="252984"/>
+          </a:xfrm>
+          <a:prstGeom prst="straightConnector1">
+            <a:avLst/>
+          </a:prstGeom>
+          <a:ln w="25400">
+            <a:tailEnd type="triangle"/>
+          </a:ln>
+        </p:spPr>
+        <p:style>
+          <a:lnRef idx="1">
+            <a:schemeClr val="accent1"/>
+          </a:lnRef>
+          <a:fillRef idx="0">
+            <a:schemeClr val="accent1"/>
+          </a:fillRef>
+          <a:effectRef idx="0">
+            <a:schemeClr val="accent1"/>
+          </a:effectRef>
+          <a:fontRef idx="minor">
+            <a:schemeClr val="tx1"/>
+          </a:fontRef>
+        </p:style>
+      </p:cxnSp>
+      <p:cxnSp>
+        <p:nvCxnSpPr>
+          <p:cNvPr id="14" name="Gerade Verbindung mit Pfeil 13">
+            <a:extLst>
+              <a:ext uri="{FF2B5EF4-FFF2-40B4-BE49-F238E27FC236}">
+                <a16:creationId xmlns:a16="http://schemas.microsoft.com/office/drawing/2014/main" id="{78A6E56C-EFB8-4057-AE5E-F36EBFFD19B9}"/>
+              </a:ext>
+            </a:extLst>
+          </p:cNvPr>
+          <p:cNvCxnSpPr>
+            <a:cxnSpLocks/>
+            <a:stCxn id="9" idx="0"/>
+            <a:endCxn id="32" idx="2"/>
+          </p:cNvCxnSpPr>
+          <p:nvPr/>
+        </p:nvCxnSpPr>
+        <p:spPr>
+          <a:xfrm flipV="1">
+            <a:off x="2416728" y="2475812"/>
+            <a:ext cx="0" cy="276999"/>
+          </a:xfrm>
+          <a:prstGeom prst="straightConnector1">
+            <a:avLst/>
+          </a:prstGeom>
+          <a:ln w="25400">
+            <a:tailEnd type="triangle"/>
+          </a:ln>
+        </p:spPr>
+        <p:style>
+          <a:lnRef idx="1">
+            <a:schemeClr val="accent1"/>
+          </a:lnRef>
+          <a:fillRef idx="0">
+            <a:schemeClr val="accent1"/>
+          </a:fillRef>
+          <a:effectRef idx="0">
+            <a:schemeClr val="accent1"/>
+          </a:effectRef>
+          <a:fontRef idx="minor">
+            <a:schemeClr val="tx1"/>
+          </a:fontRef>
+        </p:style>
+      </p:cxnSp>
+      <p:cxnSp>
+        <p:nvCxnSpPr>
+          <p:cNvPr id="15" name="Gerade Verbindung mit Pfeil 14">
+            <a:extLst>
+              <a:ext uri="{FF2B5EF4-FFF2-40B4-BE49-F238E27FC236}">
+                <a16:creationId xmlns:a16="http://schemas.microsoft.com/office/drawing/2014/main" id="{A8C06841-2F38-436D-937D-B0C8E84F0E07}"/>
+              </a:ext>
+            </a:extLst>
+          </p:cNvPr>
+          <p:cNvCxnSpPr>
+            <a:cxnSpLocks/>
+            <a:stCxn id="32" idx="0"/>
+            <a:endCxn id="11" idx="2"/>
+          </p:cNvCxnSpPr>
+          <p:nvPr/>
+        </p:nvCxnSpPr>
+        <p:spPr>
+          <a:xfrm flipV="1">
+            <a:off x="2416728" y="1920256"/>
+            <a:ext cx="0" cy="278557"/>
+          </a:xfrm>
+          <a:prstGeom prst="straightConnector1">
+            <a:avLst/>
+          </a:prstGeom>
+          <a:ln w="25400">
+            <a:tailEnd type="triangle"/>
+          </a:ln>
+        </p:spPr>
+        <p:style>
+          <a:lnRef idx="1">
+            <a:schemeClr val="accent1"/>
+          </a:lnRef>
+          <a:fillRef idx="0">
+            <a:schemeClr val="accent1"/>
+          </a:fillRef>
+          <a:effectRef idx="0">
+            <a:schemeClr val="accent1"/>
+          </a:effectRef>
+          <a:fontRef idx="minor">
+            <a:schemeClr val="tx1"/>
+          </a:fontRef>
+        </p:style>
+      </p:cxnSp>
+      <p:sp>
+        <p:nvSpPr>
+          <p:cNvPr id="18" name="Textfeld 17">
+            <a:extLst>
+              <a:ext uri="{FF2B5EF4-FFF2-40B4-BE49-F238E27FC236}">
+                <a16:creationId xmlns:a16="http://schemas.microsoft.com/office/drawing/2014/main" id="{D2A0742A-0BE5-4413-AAAB-5CF36B462715}"/>
+              </a:ext>
+            </a:extLst>
+          </p:cNvPr>
+          <p:cNvSpPr txBox="1"/>
+          <p:nvPr/>
+        </p:nvSpPr>
+        <p:spPr>
+          <a:xfrm>
+            <a:off x="627731" y="3320632"/>
+            <a:ext cx="934287" cy="461665"/>
+          </a:xfrm>
+          <a:prstGeom prst="rect">
+            <a:avLst/>
+          </a:prstGeom>
+          <a:noFill/>
+        </p:spPr>
+        <p:txBody>
+          <a:bodyPr wrap="square" rtlCol="0">
+            <a:spAutoFit/>
+          </a:bodyPr>
+          <a:lstStyle/>
+          <a:p>
+            <a:r>
+              <a:rPr lang="de-DE" sz="1200" dirty="0">
+                <a:latin typeface="Arial" panose="020B0604020202020204" pitchFamily="34" charset="0"/>
+                <a:cs typeface="Arial" panose="020B0604020202020204" pitchFamily="34" charset="0"/>
+              </a:rPr>
+              <a:t>MobileNet-V2</a:t>
+            </a:r>
+          </a:p>
+        </p:txBody>
+      </p:sp>
+      <p:sp>
+        <p:nvSpPr>
+          <p:cNvPr id="25" name="Rechteck: abgerundete Ecken 24">
+            <a:extLst>
+              <a:ext uri="{FF2B5EF4-FFF2-40B4-BE49-F238E27FC236}">
+                <a16:creationId xmlns:a16="http://schemas.microsoft.com/office/drawing/2014/main" id="{A5EAB78C-057F-43B5-8B74-A25AE36EB365}"/>
+              </a:ext>
+            </a:extLst>
+          </p:cNvPr>
+          <p:cNvSpPr/>
+          <p:nvPr/>
+        </p:nvSpPr>
+        <p:spPr>
+          <a:xfrm>
+            <a:off x="4728714" y="1457214"/>
+            <a:ext cx="1850365" cy="2296241"/>
+          </a:xfrm>
+          <a:prstGeom prst="roundRect">
+            <a:avLst/>
+          </a:prstGeom>
+          <a:noFill/>
+        </p:spPr>
+        <p:style>
+          <a:lnRef idx="2">
+            <a:schemeClr val="accent1">
+              <a:shade val="50000"/>
+            </a:schemeClr>
+          </a:lnRef>
+          <a:fillRef idx="1">
+            <a:schemeClr val="accent1"/>
+          </a:fillRef>
+          <a:effectRef idx="0">
+            <a:schemeClr val="accent1"/>
+          </a:effectRef>
+          <a:fontRef idx="minor">
+            <a:schemeClr val="lt1"/>
+          </a:fontRef>
+        </p:style>
+        <p:txBody>
+          <a:bodyPr rtlCol="0" anchor="ctr"/>
+          <a:lstStyle/>
+          <a:p>
+            <a:pPr algn="ctr"/>
+            <a:endParaRPr lang="en-GB" sz="1200" dirty="0">
+              <a:latin typeface="Arial" panose="020B0604020202020204" pitchFamily="34" charset="0"/>
+              <a:cs typeface="Arial" panose="020B0604020202020204" pitchFamily="34" charset="0"/>
+            </a:endParaRPr>
+          </a:p>
+        </p:txBody>
+      </p:sp>
+      <p:sp>
+        <p:nvSpPr>
+          <p:cNvPr id="26" name="Textfeld 25">
+            <a:extLst>
+              <a:ext uri="{FF2B5EF4-FFF2-40B4-BE49-F238E27FC236}">
+                <a16:creationId xmlns:a16="http://schemas.microsoft.com/office/drawing/2014/main" id="{D64BF3F0-CA85-47AE-981A-95E0EA657D69}"/>
+              </a:ext>
+            </a:extLst>
+          </p:cNvPr>
+          <p:cNvSpPr txBox="1"/>
+          <p:nvPr/>
+        </p:nvSpPr>
+        <p:spPr>
+          <a:xfrm>
+            <a:off x="3936458" y="3261658"/>
+            <a:ext cx="900869" cy="461665"/>
+          </a:xfrm>
+          <a:prstGeom prst="rect">
+            <a:avLst/>
+          </a:prstGeom>
+          <a:noFill/>
+        </p:spPr>
+        <p:txBody>
+          <a:bodyPr wrap="square" rtlCol="0">
+            <a:spAutoFit/>
+          </a:bodyPr>
+          <a:lstStyle/>
+          <a:p>
+            <a:r>
+              <a:rPr lang="de-DE" sz="1200" dirty="0">
+                <a:latin typeface="Arial" panose="020B0604020202020204" pitchFamily="34" charset="0"/>
+                <a:cs typeface="Arial" panose="020B0604020202020204" pitchFamily="34" charset="0"/>
+              </a:rPr>
+              <a:t>SFAM-Netzwerk</a:t>
+            </a:r>
+          </a:p>
+        </p:txBody>
+      </p:sp>
+      <p:cxnSp>
+        <p:nvCxnSpPr>
+          <p:cNvPr id="31" name="Verbinder: gewinkelt 30">
+            <a:extLst>
+              <a:ext uri="{FF2B5EF4-FFF2-40B4-BE49-F238E27FC236}">
+                <a16:creationId xmlns:a16="http://schemas.microsoft.com/office/drawing/2014/main" id="{480E2891-D423-44DB-ADED-607A769EA9E1}"/>
+              </a:ext>
+            </a:extLst>
+          </p:cNvPr>
+          <p:cNvCxnSpPr>
+            <a:cxnSpLocks/>
+            <a:stCxn id="7" idx="2"/>
+            <a:endCxn id="25" idx="1"/>
+          </p:cNvCxnSpPr>
+          <p:nvPr/>
+        </p:nvCxnSpPr>
+        <p:spPr>
+          <a:xfrm rot="16200000" flipH="1">
+            <a:off x="4194069" y="2070690"/>
+            <a:ext cx="385646" cy="683643"/>
+          </a:xfrm>
+          <a:prstGeom prst="bentConnector2">
+            <a:avLst/>
+          </a:prstGeom>
+          <a:ln w="25400">
+            <a:tailEnd type="triangle"/>
+          </a:ln>
+        </p:spPr>
+        <p:style>
+          <a:lnRef idx="1">
+            <a:schemeClr val="accent1"/>
+          </a:lnRef>
+          <a:fillRef idx="0">
+            <a:schemeClr val="accent1"/>
+          </a:fillRef>
+          <a:effectRef idx="0">
+            <a:schemeClr val="accent1"/>
+          </a:effectRef>
+          <a:fontRef idx="minor">
+            <a:schemeClr val="tx1"/>
+          </a:fontRef>
+        </p:style>
+      </p:cxnSp>
+      <p:sp>
+        <p:nvSpPr>
+          <p:cNvPr id="32" name="Textfeld 31">
+            <a:extLst>
+              <a:ext uri="{FF2B5EF4-FFF2-40B4-BE49-F238E27FC236}">
+                <a16:creationId xmlns:a16="http://schemas.microsoft.com/office/drawing/2014/main" id="{36C9110B-4EC6-49E3-8838-42DE90052D42}"/>
+              </a:ext>
+            </a:extLst>
+          </p:cNvPr>
+          <p:cNvSpPr txBox="1"/>
+          <p:nvPr/>
+        </p:nvSpPr>
+        <p:spPr>
+          <a:xfrm>
+            <a:off x="2245693" y="2198813"/>
+            <a:ext cx="342070" cy="276999"/>
+          </a:xfrm>
+          <a:prstGeom prst="rect">
+            <a:avLst/>
+          </a:prstGeom>
+          <a:noFill/>
+        </p:spPr>
+        <p:txBody>
+          <a:bodyPr wrap="square" rtlCol="0">
+            <a:spAutoFit/>
+          </a:bodyPr>
+          <a:lstStyle/>
+          <a:p>
+            <a:r>
+              <a:rPr lang="de-DE" sz="1200" b="1" dirty="0">
+                <a:latin typeface="Arial" panose="020B0604020202020204" pitchFamily="34" charset="0"/>
+                <a:cs typeface="Arial" panose="020B0604020202020204" pitchFamily="34" charset="0"/>
+              </a:rPr>
+              <a:t>...</a:t>
+            </a:r>
+          </a:p>
+        </p:txBody>
+      </p:sp>
+      <p:sp>
+        <p:nvSpPr>
+          <p:cNvPr id="35" name="Rechteck 34">
+            <a:extLst>
+              <a:ext uri="{FF2B5EF4-FFF2-40B4-BE49-F238E27FC236}">
+                <a16:creationId xmlns:a16="http://schemas.microsoft.com/office/drawing/2014/main" id="{FE3BF8FF-3D5B-482B-A1AC-5347F81EDBC3}"/>
+              </a:ext>
+            </a:extLst>
+          </p:cNvPr>
+          <p:cNvSpPr/>
+          <p:nvPr/>
+        </p:nvSpPr>
+        <p:spPr>
+          <a:xfrm rot="16200000">
+            <a:off x="4343654" y="2443102"/>
+            <a:ext cx="1430594" cy="324464"/>
+          </a:xfrm>
+          <a:prstGeom prst="rect">
+            <a:avLst/>
+          </a:prstGeom>
+        </p:spPr>
+        <p:style>
+          <a:lnRef idx="2">
+            <a:schemeClr val="accent1">
+              <a:shade val="50000"/>
+            </a:schemeClr>
+          </a:lnRef>
+          <a:fillRef idx="1">
+            <a:schemeClr val="accent1"/>
+          </a:fillRef>
+          <a:effectRef idx="0">
+            <a:schemeClr val="accent1"/>
+          </a:effectRef>
+          <a:fontRef idx="minor">
+            <a:schemeClr val="lt1"/>
+          </a:fontRef>
+        </p:style>
+        <p:txBody>
+          <a:bodyPr rtlCol="0" anchor="ctr"/>
+          <a:lstStyle/>
+          <a:p>
+            <a:pPr algn="ctr"/>
+            <a:endParaRPr lang="en-GB"/>
+          </a:p>
+        </p:txBody>
+      </p:sp>
+      <p:sp>
+        <p:nvSpPr>
+          <p:cNvPr id="36" name="Rechteck 35">
+            <a:extLst>
+              <a:ext uri="{FF2B5EF4-FFF2-40B4-BE49-F238E27FC236}">
+                <a16:creationId xmlns:a16="http://schemas.microsoft.com/office/drawing/2014/main" id="{001A82CD-CC24-4E39-910A-63568931E809}"/>
+              </a:ext>
+            </a:extLst>
+          </p:cNvPr>
+          <p:cNvSpPr/>
+          <p:nvPr/>
+        </p:nvSpPr>
+        <p:spPr>
+          <a:xfrm rot="16200000">
+            <a:off x="4947456" y="2326953"/>
+            <a:ext cx="1430594" cy="556762"/>
+          </a:xfrm>
+          <a:prstGeom prst="rect">
+            <a:avLst/>
+          </a:prstGeom>
+        </p:spPr>
+        <p:style>
+          <a:lnRef idx="2">
+            <a:schemeClr val="accent1">
+              <a:shade val="50000"/>
+            </a:schemeClr>
+          </a:lnRef>
+          <a:fillRef idx="1">
+            <a:schemeClr val="accent1"/>
+          </a:fillRef>
+          <a:effectRef idx="0">
+            <a:schemeClr val="accent1"/>
+          </a:effectRef>
+          <a:fontRef idx="minor">
+            <a:schemeClr val="lt1"/>
+          </a:fontRef>
+        </p:style>
+        <p:txBody>
+          <a:bodyPr rtlCol="0" anchor="ctr"/>
+          <a:lstStyle/>
+          <a:p>
+            <a:pPr algn="ctr"/>
+            <a:endParaRPr lang="en-GB"/>
+          </a:p>
+        </p:txBody>
+      </p:sp>
+      <p:sp>
+        <p:nvSpPr>
+          <p:cNvPr id="37" name="Rechteck 36">
+            <a:extLst>
+              <a:ext uri="{FF2B5EF4-FFF2-40B4-BE49-F238E27FC236}">
+                <a16:creationId xmlns:a16="http://schemas.microsoft.com/office/drawing/2014/main" id="{D2D21010-E75F-4370-B108-B0558929C222}"/>
+              </a:ext>
+            </a:extLst>
+          </p:cNvPr>
+          <p:cNvSpPr/>
+          <p:nvPr/>
+        </p:nvSpPr>
+        <p:spPr>
+          <a:xfrm rot="16200000">
+            <a:off x="5542935" y="2445817"/>
+            <a:ext cx="1430594" cy="324464"/>
+          </a:xfrm>
+          <a:prstGeom prst="rect">
+            <a:avLst/>
+          </a:prstGeom>
+        </p:spPr>
+        <p:style>
+          <a:lnRef idx="2">
+            <a:schemeClr val="accent1">
+              <a:shade val="50000"/>
+            </a:schemeClr>
+          </a:lnRef>
+          <a:fillRef idx="1">
+            <a:schemeClr val="accent1"/>
+          </a:fillRef>
+          <a:effectRef idx="0">
+            <a:schemeClr val="accent1"/>
+          </a:effectRef>
+          <a:fontRef idx="minor">
+            <a:schemeClr val="lt1"/>
+          </a:fontRef>
+        </p:style>
+        <p:txBody>
+          <a:bodyPr rtlCol="0" anchor="ctr"/>
+          <a:lstStyle/>
+          <a:p>
+            <a:pPr algn="ctr"/>
+            <a:endParaRPr lang="en-GB"/>
+          </a:p>
+        </p:txBody>
+      </p:sp>
+      <p:cxnSp>
+        <p:nvCxnSpPr>
+          <p:cNvPr id="39" name="Gerade Verbindung mit Pfeil 38">
+            <a:extLst>
+              <a:ext uri="{FF2B5EF4-FFF2-40B4-BE49-F238E27FC236}">
+                <a16:creationId xmlns:a16="http://schemas.microsoft.com/office/drawing/2014/main" id="{AD29A471-E7BD-4BCF-8244-7AD2A310140F}"/>
+              </a:ext>
+            </a:extLst>
+          </p:cNvPr>
+          <p:cNvCxnSpPr>
+            <a:cxnSpLocks/>
+            <a:stCxn id="35" idx="2"/>
+            <a:endCxn id="36" idx="0"/>
+          </p:cNvCxnSpPr>
+          <p:nvPr/>
+        </p:nvCxnSpPr>
+        <p:spPr>
+          <a:xfrm>
+            <a:off x="5221183" y="2605334"/>
+            <a:ext cx="163189" cy="0"/>
+          </a:xfrm>
+          <a:prstGeom prst="straightConnector1">
+            <a:avLst/>
+          </a:prstGeom>
+          <a:ln w="25400">
+            <a:tailEnd type="triangle"/>
+          </a:ln>
+        </p:spPr>
+        <p:style>
+          <a:lnRef idx="1">
+            <a:schemeClr val="accent1"/>
+          </a:lnRef>
+          <a:fillRef idx="0">
+            <a:schemeClr val="accent1"/>
+          </a:fillRef>
+          <a:effectRef idx="0">
+            <a:schemeClr val="accent1"/>
+          </a:effectRef>
+          <a:fontRef idx="minor">
+            <a:schemeClr val="tx1"/>
+          </a:fontRef>
+        </p:style>
+      </p:cxnSp>
+      <p:cxnSp>
+        <p:nvCxnSpPr>
+          <p:cNvPr id="42" name="Gerade Verbindung mit Pfeil 41">
+            <a:extLst>
+              <a:ext uri="{FF2B5EF4-FFF2-40B4-BE49-F238E27FC236}">
+                <a16:creationId xmlns:a16="http://schemas.microsoft.com/office/drawing/2014/main" id="{8A295437-E029-403E-85E5-8BCD35BBB91A}"/>
+              </a:ext>
+            </a:extLst>
+          </p:cNvPr>
+          <p:cNvCxnSpPr>
+            <a:cxnSpLocks/>
+            <a:stCxn id="36" idx="2"/>
+            <a:endCxn id="37" idx="0"/>
+          </p:cNvCxnSpPr>
+          <p:nvPr/>
+        </p:nvCxnSpPr>
+        <p:spPr>
+          <a:xfrm>
+            <a:off x="5941134" y="2605334"/>
+            <a:ext cx="154866" cy="2715"/>
+          </a:xfrm>
+          <a:prstGeom prst="straightConnector1">
+            <a:avLst/>
+          </a:prstGeom>
+          <a:ln w="25400">
+            <a:tailEnd type="triangle"/>
+          </a:ln>
+        </p:spPr>
+        <p:style>
+          <a:lnRef idx="1">
+            <a:schemeClr val="accent1"/>
+          </a:lnRef>
+          <a:fillRef idx="0">
+            <a:schemeClr val="accent1"/>
+          </a:fillRef>
+          <a:effectRef idx="0">
+            <a:schemeClr val="accent1"/>
+          </a:effectRef>
+          <a:fontRef idx="minor">
+            <a:schemeClr val="tx1"/>
+          </a:fontRef>
+        </p:style>
+      </p:cxnSp>
+      <p:cxnSp>
+        <p:nvCxnSpPr>
+          <p:cNvPr id="45" name="Gerade Verbindung mit Pfeil 44">
+            <a:extLst>
+              <a:ext uri="{FF2B5EF4-FFF2-40B4-BE49-F238E27FC236}">
+                <a16:creationId xmlns:a16="http://schemas.microsoft.com/office/drawing/2014/main" id="{E3FDC1BD-96A1-4BD9-82E3-89A7471CFE11}"/>
+              </a:ext>
+            </a:extLst>
+          </p:cNvPr>
+          <p:cNvCxnSpPr>
+            <a:cxnSpLocks/>
+            <a:stCxn id="25" idx="1"/>
+            <a:endCxn id="35" idx="0"/>
+          </p:cNvCxnSpPr>
+          <p:nvPr/>
+        </p:nvCxnSpPr>
+        <p:spPr>
+          <a:xfrm flipV="1">
+            <a:off x="4728714" y="2605334"/>
+            <a:ext cx="168005" cy="1"/>
+          </a:xfrm>
+          <a:prstGeom prst="straightConnector1">
+            <a:avLst/>
+          </a:prstGeom>
+          <a:ln w="25400">
+            <a:tailEnd type="triangle"/>
+          </a:ln>
+        </p:spPr>
+        <p:style>
+          <a:lnRef idx="1">
+            <a:schemeClr val="accent1"/>
+          </a:lnRef>
+          <a:fillRef idx="0">
+            <a:schemeClr val="accent1"/>
+          </a:fillRef>
+          <a:effectRef idx="0">
+            <a:schemeClr val="accent1"/>
+          </a:effectRef>
+          <a:fontRef idx="minor">
+            <a:schemeClr val="tx1"/>
+          </a:fontRef>
+        </p:style>
+      </p:cxnSp>
+      <p:cxnSp>
+        <p:nvCxnSpPr>
+          <p:cNvPr id="48" name="Gerade Verbindung mit Pfeil 47">
+            <a:extLst>
+              <a:ext uri="{FF2B5EF4-FFF2-40B4-BE49-F238E27FC236}">
+                <a16:creationId xmlns:a16="http://schemas.microsoft.com/office/drawing/2014/main" id="{31C93E29-395C-4D7E-9DA4-DE9C1945FDE5}"/>
+              </a:ext>
+            </a:extLst>
+          </p:cNvPr>
+          <p:cNvCxnSpPr>
+            <a:cxnSpLocks/>
+            <a:stCxn id="37" idx="2"/>
+          </p:cNvCxnSpPr>
+          <p:nvPr/>
+        </p:nvCxnSpPr>
+        <p:spPr>
+          <a:xfrm>
+            <a:off x="6420464" y="2608049"/>
+            <a:ext cx="483079" cy="6262"/>
+          </a:xfrm>
+          <a:prstGeom prst="straightConnector1">
+            <a:avLst/>
+          </a:prstGeom>
+          <a:ln w="25400">
+            <a:tailEnd type="triangle"/>
+          </a:ln>
+        </p:spPr>
+        <p:style>
+          <a:lnRef idx="1">
+            <a:schemeClr val="accent1"/>
+          </a:lnRef>
+          <a:fillRef idx="0">
+            <a:schemeClr val="accent1"/>
+          </a:fillRef>
+          <a:effectRef idx="0">
+            <a:schemeClr val="accent1"/>
+          </a:effectRef>
+          <a:fontRef idx="minor">
+            <a:schemeClr val="tx1"/>
+          </a:fontRef>
+        </p:style>
+      </p:cxnSp>
+      <p:sp>
+        <p:nvSpPr>
+          <p:cNvPr id="51" name="Textfeld 50">
+            <a:extLst>
+              <a:ext uri="{FF2B5EF4-FFF2-40B4-BE49-F238E27FC236}">
+                <a16:creationId xmlns:a16="http://schemas.microsoft.com/office/drawing/2014/main" id="{1DD4ECEA-AF0F-4217-9CDD-0F07D3719D77}"/>
+              </a:ext>
+            </a:extLst>
+          </p:cNvPr>
+          <p:cNvSpPr txBox="1"/>
+          <p:nvPr/>
+        </p:nvSpPr>
+        <p:spPr>
+          <a:xfrm>
+            <a:off x="6907291" y="2466835"/>
+            <a:ext cx="1102381" cy="276999"/>
+          </a:xfrm>
+          <a:prstGeom prst="rect">
+            <a:avLst/>
+          </a:prstGeom>
+          <a:noFill/>
+        </p:spPr>
+        <p:txBody>
+          <a:bodyPr wrap="square" rtlCol="0">
+            <a:spAutoFit/>
+          </a:bodyPr>
+          <a:lstStyle/>
+          <a:p>
+            <a:r>
+              <a:rPr lang="de-DE" sz="1200" dirty="0">
+                <a:latin typeface="Arial" panose="020B0604020202020204" pitchFamily="34" charset="0"/>
+                <a:cs typeface="Arial" panose="020B0604020202020204" pitchFamily="34" charset="0"/>
+              </a:rPr>
+              <a:t>Klassenlabel</a:t>
+            </a:r>
+          </a:p>
+        </p:txBody>
+      </p:sp>
+      <p:cxnSp>
+        <p:nvCxnSpPr>
+          <p:cNvPr id="55" name="Verbinder: gewinkelt 54">
+            <a:extLst>
+              <a:ext uri="{FF2B5EF4-FFF2-40B4-BE49-F238E27FC236}">
+                <a16:creationId xmlns:a16="http://schemas.microsoft.com/office/drawing/2014/main" id="{E7252F9A-4F32-44E1-89FA-FEF4271E1E20}"/>
+              </a:ext>
+            </a:extLst>
+          </p:cNvPr>
+          <p:cNvCxnSpPr>
+            <a:cxnSpLocks/>
+            <a:stCxn id="11" idx="0"/>
+            <a:endCxn id="7" idx="0"/>
+          </p:cNvCxnSpPr>
+          <p:nvPr/>
+        </p:nvCxnSpPr>
+        <p:spPr>
+          <a:xfrm rot="16200000" flipH="1">
+            <a:off x="3149783" y="862737"/>
+            <a:ext cx="162232" cy="1628343"/>
+          </a:xfrm>
+          <a:prstGeom prst="bentConnector3">
+            <a:avLst>
+              <a:gd name="adj1" fmla="val -140909"/>
+            </a:avLst>
+          </a:prstGeom>
+          <a:ln w="25400">
+            <a:tailEnd type="triangle"/>
+          </a:ln>
+        </p:spPr>
+        <p:style>
+          <a:lnRef idx="1">
+            <a:schemeClr val="accent1"/>
+          </a:lnRef>
+          <a:fillRef idx="0">
+            <a:schemeClr val="accent1"/>
+          </a:fillRef>
+          <a:effectRef idx="0">
+            <a:schemeClr val="accent1"/>
+          </a:effectRef>
+          <a:fontRef idx="minor">
+            <a:schemeClr val="tx1"/>
+          </a:fontRef>
+        </p:style>
+      </p:cxnSp>
+      <p:pic>
+        <p:nvPicPr>
+          <p:cNvPr id="61" name="Grafik 60">
+            <a:extLst>
+              <a:ext uri="{FF2B5EF4-FFF2-40B4-BE49-F238E27FC236}">
+                <a16:creationId xmlns:a16="http://schemas.microsoft.com/office/drawing/2014/main" id="{6D0D791D-B4EB-46BE-A8D4-B69CE7BE04F3}"/>
+              </a:ext>
+            </a:extLst>
+          </p:cNvPr>
+          <p:cNvPicPr>
+            <a:picLocks noChangeAspect="1"/>
+          </p:cNvPicPr>
+          <p:nvPr/>
+        </p:nvPicPr>
+        <p:blipFill>
+          <a:blip r:embed="rId2">
+            <a:extLst>
+              <a:ext uri="{28A0092B-C50C-407E-A947-70E740481C1C}">
+                <a14:useLocalDpi xmlns:a14="http://schemas.microsoft.com/office/drawing/2010/main" val="0"/>
+              </a:ext>
+            </a:extLst>
+          </a:blip>
+          <a:stretch>
+            <a:fillRect/>
+          </a:stretch>
+        </p:blipFill>
+        <p:spPr>
+          <a:xfrm>
+            <a:off x="2130591" y="4400431"/>
+            <a:ext cx="572271" cy="763027"/>
+          </a:xfrm>
+          <a:prstGeom prst="rect">
+            <a:avLst/>
+          </a:prstGeom>
+        </p:spPr>
+      </p:pic>
+    </p:spTree>
+    <p:extLst>
+      <p:ext uri="{BB962C8B-B14F-4D97-AF65-F5344CB8AC3E}">
+        <p14:creationId xmlns:p14="http://schemas.microsoft.com/office/powerpoint/2010/main" val="685174184"/>
       </p:ext>
     </p:extLst>
   </p:cSld>

</xml_diff>